<commit_message>
made changes to reflect appropriate file names
</commit_message>
<xml_diff>
--- a/Presentation/AgenticAI_Presentation.pptx
+++ b/Presentation/AgenticAI_Presentation.pptx
@@ -5,20 +5,21 @@
     <p:sldMasterId id="2147483648" r:id="rId1"/>
   </p:sldMasterIdLst>
   <p:notesMasterIdLst>
-    <p:notesMasterId r:id="rId13"/>
+    <p:notesMasterId r:id="rId14"/>
   </p:notesMasterIdLst>
   <p:sldIdLst>
     <p:sldId id="261" r:id="rId2"/>
     <p:sldId id="258" r:id="rId3"/>
     <p:sldId id="259" r:id="rId4"/>
-    <p:sldId id="257" r:id="rId5"/>
-    <p:sldId id="260" r:id="rId6"/>
-    <p:sldId id="262" r:id="rId7"/>
-    <p:sldId id="264" r:id="rId8"/>
-    <p:sldId id="265" r:id="rId9"/>
-    <p:sldId id="266" r:id="rId10"/>
-    <p:sldId id="267" r:id="rId11"/>
-    <p:sldId id="256" r:id="rId12"/>
+    <p:sldId id="260" r:id="rId5"/>
+    <p:sldId id="262" r:id="rId6"/>
+    <p:sldId id="269" r:id="rId7"/>
+    <p:sldId id="268" r:id="rId8"/>
+    <p:sldId id="264" r:id="rId9"/>
+    <p:sldId id="265" r:id="rId10"/>
+    <p:sldId id="266" r:id="rId11"/>
+    <p:sldId id="267" r:id="rId12"/>
+    <p:sldId id="256" r:id="rId13"/>
   </p:sldIdLst>
   <p:sldSz cx="12192000" cy="6858000"/>
   <p:notesSz cx="6858000" cy="9144000"/>
@@ -117,6 +118,11 @@
       </a:defRPr>
     </a:lvl9pPr>
   </p:defaultTextStyle>
+  <p:extLst>
+    <p:ext uri="{EFAFB233-063F-42B5-8137-9DF3F51BA10A}">
+      <p15:sldGuideLst xmlns:p15="http://schemas.microsoft.com/office/powerpoint/2012/main"/>
+    </p:ext>
+  </p:extLst>
 </p:presentation>
 </file>
 
@@ -202,7 +208,7 @@
           <a:p>
             <a:fld id="{8605957E-B54F-A44B-9CF2-73BDFFB35701}" type="datetimeFigureOut">
               <a:rPr lang="en-US" smtClean="0"/>
-              <a:t>3/26/25</a:t>
+              <a:t>4/2/25</a:t>
             </a:fld>
             <a:endParaRPr lang="en-US"/>
           </a:p>
@@ -702,7 +708,7 @@
           <a:p>
             <a:fld id="{306982A3-319E-0745-8875-C96EBFE5598C}" type="slidenum">
               <a:rPr lang="en-US" smtClean="0"/>
-              <a:t>11</a:t>
+              <a:t>12</a:t>
             </a:fld>
             <a:endParaRPr lang="en-US"/>
           </a:p>
@@ -868,7 +874,7 @@
           <a:p>
             <a:fld id="{DC32F712-418A-6448-A39A-7D8D507B5866}" type="datetimeFigureOut">
               <a:rPr lang="en-US" smtClean="0"/>
-              <a:t>3/23/25</a:t>
+              <a:t>4/2/25</a:t>
             </a:fld>
             <a:endParaRPr lang="en-US"/>
           </a:p>
@@ -1066,7 +1072,7 @@
           <a:p>
             <a:fld id="{DC32F712-418A-6448-A39A-7D8D507B5866}" type="datetimeFigureOut">
               <a:rPr lang="en-US" smtClean="0"/>
-              <a:t>3/23/25</a:t>
+              <a:t>4/2/25</a:t>
             </a:fld>
             <a:endParaRPr lang="en-US"/>
           </a:p>
@@ -1274,7 +1280,7 @@
           <a:p>
             <a:fld id="{DC32F712-418A-6448-A39A-7D8D507B5866}" type="datetimeFigureOut">
               <a:rPr lang="en-US" smtClean="0"/>
-              <a:t>3/23/25</a:t>
+              <a:t>4/2/25</a:t>
             </a:fld>
             <a:endParaRPr lang="en-US"/>
           </a:p>
@@ -1472,7 +1478,7 @@
           <a:p>
             <a:fld id="{DC32F712-418A-6448-A39A-7D8D507B5866}" type="datetimeFigureOut">
               <a:rPr lang="en-US" smtClean="0"/>
-              <a:t>3/23/25</a:t>
+              <a:t>4/2/25</a:t>
             </a:fld>
             <a:endParaRPr lang="en-US"/>
           </a:p>
@@ -1747,7 +1753,7 @@
           <a:p>
             <a:fld id="{DC32F712-418A-6448-A39A-7D8D507B5866}" type="datetimeFigureOut">
               <a:rPr lang="en-US" smtClean="0"/>
-              <a:t>3/23/25</a:t>
+              <a:t>4/2/25</a:t>
             </a:fld>
             <a:endParaRPr lang="en-US"/>
           </a:p>
@@ -2012,7 +2018,7 @@
           <a:p>
             <a:fld id="{DC32F712-418A-6448-A39A-7D8D507B5866}" type="datetimeFigureOut">
               <a:rPr lang="en-US" smtClean="0"/>
-              <a:t>3/23/25</a:t>
+              <a:t>4/2/25</a:t>
             </a:fld>
             <a:endParaRPr lang="en-US"/>
           </a:p>
@@ -2424,7 +2430,7 @@
           <a:p>
             <a:fld id="{DC32F712-418A-6448-A39A-7D8D507B5866}" type="datetimeFigureOut">
               <a:rPr lang="en-US" smtClean="0"/>
-              <a:t>3/23/25</a:t>
+              <a:t>4/2/25</a:t>
             </a:fld>
             <a:endParaRPr lang="en-US"/>
           </a:p>
@@ -2565,7 +2571,7 @@
           <a:p>
             <a:fld id="{DC32F712-418A-6448-A39A-7D8D507B5866}" type="datetimeFigureOut">
               <a:rPr lang="en-US" smtClean="0"/>
-              <a:t>3/23/25</a:t>
+              <a:t>4/2/25</a:t>
             </a:fld>
             <a:endParaRPr lang="en-US"/>
           </a:p>
@@ -2678,7 +2684,7 @@
           <a:p>
             <a:fld id="{DC32F712-418A-6448-A39A-7D8D507B5866}" type="datetimeFigureOut">
               <a:rPr lang="en-US" smtClean="0"/>
-              <a:t>3/23/25</a:t>
+              <a:t>4/2/25</a:t>
             </a:fld>
             <a:endParaRPr lang="en-US"/>
           </a:p>
@@ -2989,7 +2995,7 @@
           <a:p>
             <a:fld id="{DC32F712-418A-6448-A39A-7D8D507B5866}" type="datetimeFigureOut">
               <a:rPr lang="en-US" smtClean="0"/>
-              <a:t>3/23/25</a:t>
+              <a:t>4/2/25</a:t>
             </a:fld>
             <a:endParaRPr lang="en-US"/>
           </a:p>
@@ -3277,7 +3283,7 @@
           <a:p>
             <a:fld id="{DC32F712-418A-6448-A39A-7D8D507B5866}" type="datetimeFigureOut">
               <a:rPr lang="en-US" smtClean="0"/>
-              <a:t>3/23/25</a:t>
+              <a:t>4/2/25</a:t>
             </a:fld>
             <a:endParaRPr lang="en-US"/>
           </a:p>
@@ -3518,7 +3524,7 @@
           <a:p>
             <a:fld id="{DC32F712-418A-6448-A39A-7D8D507B5866}" type="datetimeFigureOut">
               <a:rPr lang="en-US" smtClean="0"/>
-              <a:t>3/23/25</a:t>
+              <a:t>4/2/25</a:t>
             </a:fld>
             <a:endParaRPr lang="en-US"/>
           </a:p>
@@ -4144,6 +4150,183 @@
         </p:nvSpPr>
         <p:spPr>
           <a:xfrm>
+            <a:off x="299655" y="74303"/>
+            <a:ext cx="2702856" cy="461665"/>
+          </a:xfrm>
+          <a:prstGeom prst="rect">
+            <a:avLst/>
+          </a:prstGeom>
+          <a:noFill/>
+        </p:spPr>
+        <p:txBody>
+          <a:bodyPr wrap="none" rtlCol="0">
+            <a:spAutoFit/>
+          </a:bodyPr>
+          <a:lstStyle/>
+          <a:p>
+            <a:r>
+              <a:rPr lang="en-US" sz="2400" dirty="0"/>
+              <a:t>Agent Orchestration</a:t>
+            </a:r>
+          </a:p>
+        </p:txBody>
+      </p:sp>
+      <p:cxnSp>
+        <p:nvCxnSpPr>
+          <p:cNvPr id="2" name="Straight Connector 1">
+            <a:extLst>
+              <a:ext uri="{FF2B5EF4-FFF2-40B4-BE49-F238E27FC236}">
+                <a16:creationId xmlns:a16="http://schemas.microsoft.com/office/drawing/2014/main" id="{22E1BF60-C091-F918-A508-C0CD2544E876}"/>
+              </a:ext>
+            </a:extLst>
+          </p:cNvPr>
+          <p:cNvCxnSpPr/>
+          <p:nvPr/>
+        </p:nvCxnSpPr>
+        <p:spPr>
+          <a:xfrm>
+            <a:off x="432619" y="545800"/>
+            <a:ext cx="11759381" cy="0"/>
+          </a:xfrm>
+          <a:prstGeom prst="line">
+            <a:avLst/>
+          </a:prstGeom>
+        </p:spPr>
+        <p:style>
+          <a:lnRef idx="3">
+            <a:schemeClr val="accent5"/>
+          </a:lnRef>
+          <a:fillRef idx="0">
+            <a:schemeClr val="accent5"/>
+          </a:fillRef>
+          <a:effectRef idx="2">
+            <a:schemeClr val="accent5"/>
+          </a:effectRef>
+          <a:fontRef idx="minor">
+            <a:schemeClr val="tx1"/>
+          </a:fontRef>
+        </p:style>
+      </p:cxnSp>
+      <p:pic>
+        <p:nvPicPr>
+          <p:cNvPr id="3" name="Picture 2">
+            <a:extLst>
+              <a:ext uri="{FF2B5EF4-FFF2-40B4-BE49-F238E27FC236}">
+                <a16:creationId xmlns:a16="http://schemas.microsoft.com/office/drawing/2014/main" id="{06D2A7A1-41B6-3809-CE19-54125905CBE9}"/>
+              </a:ext>
+            </a:extLst>
+          </p:cNvPr>
+          <p:cNvPicPr>
+            <a:picLocks noChangeAspect="1"/>
+          </p:cNvPicPr>
+          <p:nvPr/>
+        </p:nvPicPr>
+        <p:blipFill>
+          <a:blip r:embed="rId2"/>
+          <a:stretch>
+            <a:fillRect/>
+          </a:stretch>
+        </p:blipFill>
+        <p:spPr>
+          <a:xfrm>
+            <a:off x="1895168" y="683452"/>
+            <a:ext cx="8331200" cy="1544320"/>
+          </a:xfrm>
+          <a:prstGeom prst="rect">
+            <a:avLst/>
+          </a:prstGeom>
+          <a:effectLst>
+            <a:glow rad="63500">
+              <a:schemeClr val="accent5">
+                <a:satMod val="175000"/>
+                <a:alpha val="40000"/>
+              </a:schemeClr>
+            </a:glow>
+          </a:effectLst>
+        </p:spPr>
+      </p:pic>
+      <p:pic>
+        <p:nvPicPr>
+          <p:cNvPr id="5" name="Picture 4">
+            <a:extLst>
+              <a:ext uri="{FF2B5EF4-FFF2-40B4-BE49-F238E27FC236}">
+                <a16:creationId xmlns:a16="http://schemas.microsoft.com/office/drawing/2014/main" id="{032B032F-B08F-D8D1-3E1F-E0A14A3D7972}"/>
+              </a:ext>
+            </a:extLst>
+          </p:cNvPr>
+          <p:cNvPicPr>
+            <a:picLocks noChangeAspect="1"/>
+          </p:cNvPicPr>
+          <p:nvPr/>
+        </p:nvPicPr>
+        <p:blipFill>
+          <a:blip r:embed="rId3"/>
+          <a:stretch>
+            <a:fillRect/>
+          </a:stretch>
+        </p:blipFill>
+        <p:spPr>
+          <a:xfrm>
+            <a:off x="1910187" y="2365423"/>
+            <a:ext cx="8320278" cy="4245356"/>
+          </a:xfrm>
+          <a:prstGeom prst="rect">
+            <a:avLst/>
+          </a:prstGeom>
+          <a:effectLst>
+            <a:glow rad="101600">
+              <a:schemeClr val="accent5">
+                <a:satMod val="175000"/>
+                <a:alpha val="40000"/>
+              </a:schemeClr>
+            </a:glow>
+          </a:effectLst>
+        </p:spPr>
+      </p:pic>
+    </p:spTree>
+    <p:extLst>
+      <p:ext uri="{BB962C8B-B14F-4D97-AF65-F5344CB8AC3E}">
+        <p14:creationId xmlns:p14="http://schemas.microsoft.com/office/powerpoint/2010/main" val="2777634583"/>
+      </p:ext>
+    </p:extLst>
+  </p:cSld>
+  <p:clrMapOvr>
+    <a:masterClrMapping/>
+  </p:clrMapOvr>
+</p:sld>
+</file>
+
+<file path=ppt/slides/slide11.xml><?xml version="1.0" encoding="utf-8"?>
+<p:sld xmlns:a="http://schemas.openxmlformats.org/drawingml/2006/main" xmlns:r="http://schemas.openxmlformats.org/officeDocument/2006/relationships" xmlns:p="http://schemas.openxmlformats.org/presentationml/2006/main">
+  <p:cSld>
+    <p:spTree>
+      <p:nvGrpSpPr>
+        <p:cNvPr id="1" name=""/>
+        <p:cNvGrpSpPr/>
+        <p:nvPr/>
+      </p:nvGrpSpPr>
+      <p:grpSpPr>
+        <a:xfrm>
+          <a:off x="0" y="0"/>
+          <a:ext cx="0" cy="0"/>
+          <a:chOff x="0" y="0"/>
+          <a:chExt cx="0" cy="0"/>
+        </a:xfrm>
+      </p:grpSpPr>
+      <p:sp>
+        <p:nvSpPr>
+          <p:cNvPr id="4" name="TextBox 3">
+            <a:extLst>
+              <a:ext uri="{FF2B5EF4-FFF2-40B4-BE49-F238E27FC236}">
+                <a16:creationId xmlns:a16="http://schemas.microsoft.com/office/drawing/2014/main" id="{0B205ED7-CA2A-2FFE-8AF6-7C1545C8E1FC}"/>
+              </a:ext>
+            </a:extLst>
+          </p:cNvPr>
+          <p:cNvSpPr txBox="1"/>
+          <p:nvPr/>
+        </p:nvSpPr>
+        <p:spPr>
+          <a:xfrm>
             <a:off x="378314" y="2719180"/>
             <a:ext cx="1367682" cy="461665"/>
           </a:xfrm>
@@ -4214,7 +4397,7 @@
 </p:sld>
 </file>
 
-<file path=ppt/slides/slide11.xml><?xml version="1.0" encoding="utf-8"?>
+<file path=ppt/slides/slide12.xml><?xml version="1.0" encoding="utf-8"?>
 <p:sld xmlns:a="http://schemas.openxmlformats.org/drawingml/2006/main" xmlns:r="http://schemas.openxmlformats.org/officeDocument/2006/relationships" xmlns:p="http://schemas.openxmlformats.org/presentationml/2006/main">
   <p:cSld>
     <p:spTree>
@@ -4783,23 +4966,29 @@
         </p:nvSpPr>
         <p:spPr>
           <a:xfrm>
-            <a:off x="1982454" y="1248203"/>
+            <a:off x="1982454" y="1480812"/>
             <a:ext cx="1463040" cy="1463040"/>
           </a:xfrm>
           <a:prstGeom prst="ellipse">
             <a:avLst/>
           </a:prstGeom>
+          <a:ln>
+            <a:solidFill>
+              <a:schemeClr val="tx2">
+                <a:lumMod val="60000"/>
+                <a:lumOff val="40000"/>
+              </a:schemeClr>
+            </a:solidFill>
+          </a:ln>
         </p:spPr>
         <p:style>
-          <a:lnRef idx="2">
-            <a:schemeClr val="accent1">
-              <a:shade val="15000"/>
-            </a:schemeClr>
+          <a:lnRef idx="3">
+            <a:schemeClr val="lt1"/>
           </a:lnRef>
           <a:fillRef idx="1">
             <a:schemeClr val="accent1"/>
           </a:fillRef>
-          <a:effectRef idx="0">
+          <a:effectRef idx="1">
             <a:schemeClr val="accent1"/>
           </a:effectRef>
           <a:fontRef idx="minor">
@@ -4832,23 +5021,29 @@
         </p:nvSpPr>
         <p:spPr>
           <a:xfrm>
-            <a:off x="4041827" y="1248203"/>
+            <a:off x="4041827" y="1480812"/>
             <a:ext cx="1463040" cy="1463040"/>
           </a:xfrm>
           <a:prstGeom prst="ellipse">
             <a:avLst/>
           </a:prstGeom>
+          <a:ln>
+            <a:solidFill>
+              <a:schemeClr val="tx2">
+                <a:lumMod val="60000"/>
+                <a:lumOff val="40000"/>
+              </a:schemeClr>
+            </a:solidFill>
+          </a:ln>
         </p:spPr>
         <p:style>
-          <a:lnRef idx="2">
-            <a:schemeClr val="accent1">
-              <a:shade val="15000"/>
-            </a:schemeClr>
+          <a:lnRef idx="3">
+            <a:schemeClr val="lt1"/>
           </a:lnRef>
           <a:fillRef idx="1">
             <a:schemeClr val="accent1"/>
           </a:fillRef>
-          <a:effectRef idx="0">
+          <a:effectRef idx="1">
             <a:schemeClr val="accent1"/>
           </a:effectRef>
           <a:fontRef idx="minor">
@@ -4882,23 +5077,29 @@
         </p:nvSpPr>
         <p:spPr>
           <a:xfrm>
-            <a:off x="6237397" y="1248201"/>
+            <a:off x="6237397" y="1480810"/>
             <a:ext cx="1463040" cy="1463040"/>
           </a:xfrm>
           <a:prstGeom prst="ellipse">
             <a:avLst/>
           </a:prstGeom>
+          <a:ln>
+            <a:solidFill>
+              <a:schemeClr val="tx2">
+                <a:lumMod val="60000"/>
+                <a:lumOff val="40000"/>
+              </a:schemeClr>
+            </a:solidFill>
+          </a:ln>
         </p:spPr>
         <p:style>
-          <a:lnRef idx="2">
-            <a:schemeClr val="accent1">
-              <a:shade val="15000"/>
-            </a:schemeClr>
+          <a:lnRef idx="3">
+            <a:schemeClr val="lt1"/>
           </a:lnRef>
           <a:fillRef idx="1">
             <a:schemeClr val="accent1"/>
           </a:fillRef>
-          <a:effectRef idx="0">
+          <a:effectRef idx="1">
             <a:schemeClr val="accent1"/>
           </a:effectRef>
           <a:fontRef idx="minor">
@@ -4931,23 +5132,29 @@
         </p:nvSpPr>
         <p:spPr>
           <a:xfrm>
-            <a:off x="8196145" y="1248203"/>
+            <a:off x="8196145" y="1480812"/>
             <a:ext cx="1463040" cy="1463040"/>
           </a:xfrm>
           <a:prstGeom prst="ellipse">
             <a:avLst/>
           </a:prstGeom>
+          <a:ln>
+            <a:solidFill>
+              <a:schemeClr val="tx2">
+                <a:lumMod val="60000"/>
+                <a:lumOff val="40000"/>
+              </a:schemeClr>
+            </a:solidFill>
+          </a:ln>
         </p:spPr>
         <p:style>
-          <a:lnRef idx="2">
-            <a:schemeClr val="accent1">
-              <a:shade val="15000"/>
-            </a:schemeClr>
+          <a:lnRef idx="3">
+            <a:schemeClr val="lt1"/>
           </a:lnRef>
           <a:fillRef idx="1">
             <a:schemeClr val="accent1"/>
           </a:fillRef>
-          <a:effectRef idx="0">
+          <a:effectRef idx="1">
             <a:schemeClr val="accent1"/>
           </a:effectRef>
           <a:fontRef idx="minor">
@@ -4980,23 +5187,29 @@
         </p:nvSpPr>
         <p:spPr>
           <a:xfrm>
-            <a:off x="10255518" y="1248201"/>
+            <a:off x="10255518" y="1480810"/>
             <a:ext cx="1463040" cy="1463040"/>
           </a:xfrm>
           <a:prstGeom prst="ellipse">
             <a:avLst/>
           </a:prstGeom>
+          <a:ln>
+            <a:solidFill>
+              <a:schemeClr val="tx2">
+                <a:lumMod val="60000"/>
+                <a:lumOff val="40000"/>
+              </a:schemeClr>
+            </a:solidFill>
+          </a:ln>
         </p:spPr>
         <p:style>
-          <a:lnRef idx="2">
-            <a:schemeClr val="accent1">
-              <a:shade val="15000"/>
-            </a:schemeClr>
+          <a:lnRef idx="3">
+            <a:schemeClr val="lt1"/>
           </a:lnRef>
           <a:fillRef idx="1">
             <a:schemeClr val="accent1"/>
           </a:fillRef>
-          <a:effectRef idx="0">
+          <a:effectRef idx="1">
             <a:schemeClr val="accent1"/>
           </a:effectRef>
           <a:fontRef idx="minor">
@@ -5029,23 +5242,29 @@
         </p:nvSpPr>
         <p:spPr>
           <a:xfrm>
-            <a:off x="120687" y="1248203"/>
+            <a:off x="120687" y="1480812"/>
             <a:ext cx="1463040" cy="1463040"/>
           </a:xfrm>
           <a:prstGeom prst="ellipse">
             <a:avLst/>
           </a:prstGeom>
+          <a:ln>
+            <a:solidFill>
+              <a:schemeClr val="tx2">
+                <a:lumMod val="60000"/>
+                <a:lumOff val="40000"/>
+              </a:schemeClr>
+            </a:solidFill>
+          </a:ln>
         </p:spPr>
         <p:style>
-          <a:lnRef idx="2">
-            <a:schemeClr val="accent1">
-              <a:shade val="15000"/>
-            </a:schemeClr>
+          <a:lnRef idx="3">
+            <a:schemeClr val="lt1"/>
           </a:lnRef>
           <a:fillRef idx="1">
             <a:schemeClr val="accent1"/>
           </a:fillRef>
-          <a:effectRef idx="0">
+          <a:effectRef idx="1">
             <a:schemeClr val="accent1"/>
           </a:effectRef>
           <a:fontRef idx="minor">
@@ -5380,7 +5599,7 @@
         </p:nvSpPr>
         <p:spPr>
           <a:xfrm>
-            <a:off x="339549" y="2711240"/>
+            <a:off x="240626" y="3521310"/>
             <a:ext cx="906595" cy="276999"/>
           </a:xfrm>
           <a:prstGeom prst="rect">
@@ -5415,7 +5634,7 @@
         </p:nvSpPr>
         <p:spPr>
           <a:xfrm>
-            <a:off x="1965725" y="2711240"/>
+            <a:off x="1987117" y="3521310"/>
             <a:ext cx="1298753" cy="276999"/>
           </a:xfrm>
           <a:prstGeom prst="rect">
@@ -5450,7 +5669,7 @@
         </p:nvSpPr>
         <p:spPr>
           <a:xfrm>
-            <a:off x="4220834" y="2711240"/>
+            <a:off x="4210142" y="3521310"/>
             <a:ext cx="1033040" cy="276999"/>
           </a:xfrm>
           <a:prstGeom prst="rect">
@@ -5485,8 +5704,8 @@
         </p:nvSpPr>
         <p:spPr>
           <a:xfrm>
-            <a:off x="6082481" y="2721336"/>
-            <a:ext cx="1875826" cy="461665"/>
+            <a:off x="6253280" y="3519875"/>
+            <a:ext cx="1431515" cy="461665"/>
           </a:xfrm>
           <a:prstGeom prst="rect">
             <a:avLst/>
@@ -5528,7 +5747,7 @@
         </p:nvSpPr>
         <p:spPr>
           <a:xfrm>
-            <a:off x="8133254" y="2711756"/>
+            <a:off x="8034331" y="3521826"/>
             <a:ext cx="1589281" cy="276999"/>
           </a:xfrm>
           <a:prstGeom prst="rect">
@@ -5563,7 +5782,7 @@
         </p:nvSpPr>
         <p:spPr>
           <a:xfrm>
-            <a:off x="10092002" y="2686321"/>
+            <a:off x="9993079" y="3496391"/>
             <a:ext cx="1818575" cy="276999"/>
           </a:xfrm>
           <a:prstGeom prst="rect">
@@ -5598,7 +5817,7 @@
         </p:nvSpPr>
         <p:spPr>
           <a:xfrm>
-            <a:off x="165829" y="3968499"/>
+            <a:off x="139202" y="3362600"/>
             <a:ext cx="11808542" cy="178259"/>
           </a:xfrm>
           <a:prstGeom prst="rightArrow">
@@ -5670,8 +5889,8 @@
         </p:nvSpPr>
         <p:spPr>
           <a:xfrm>
-            <a:off x="217629" y="3780022"/>
-            <a:ext cx="1082348" cy="276999"/>
+            <a:off x="479460" y="3055595"/>
+            <a:ext cx="559769" cy="276999"/>
           </a:xfrm>
           <a:prstGeom prst="rect">
             <a:avLst/>
@@ -5693,7 +5912,7 @@
                   </a:schemeClr>
                 </a:solidFill>
               </a:rPr>
-              <a:t>1950s – 1980s</a:t>
+              <a:t>1950s</a:t>
             </a:r>
           </a:p>
         </p:txBody>
@@ -5712,8 +5931,8 @@
         </p:nvSpPr>
         <p:spPr>
           <a:xfrm>
-            <a:off x="2185326" y="3780022"/>
-            <a:ext cx="1082348" cy="276999"/>
+            <a:off x="2438261" y="3055000"/>
+            <a:ext cx="559769" cy="276999"/>
           </a:xfrm>
           <a:prstGeom prst="rect">
             <a:avLst/>
@@ -5735,7 +5954,7 @@
                   </a:schemeClr>
                 </a:solidFill>
               </a:rPr>
-              <a:t>1990s – 2015s</a:t>
+              <a:t>1990s</a:t>
             </a:r>
           </a:p>
         </p:txBody>
@@ -5754,8 +5973,8 @@
         </p:nvSpPr>
         <p:spPr>
           <a:xfrm>
-            <a:off x="4269700" y="3777766"/>
-            <a:ext cx="1082348" cy="276999"/>
+            <a:off x="4493173" y="3054999"/>
+            <a:ext cx="559769" cy="276999"/>
           </a:xfrm>
           <a:prstGeom prst="rect">
             <a:avLst/>
@@ -5777,7 +5996,7 @@
                   </a:schemeClr>
                 </a:solidFill>
               </a:rPr>
-              <a:t>2015s – 2020s</a:t>
+              <a:t>2015s</a:t>
             </a:r>
           </a:p>
         </p:txBody>
@@ -5796,8 +6015,8 @@
         </p:nvSpPr>
         <p:spPr>
           <a:xfrm>
-            <a:off x="6432389" y="3777766"/>
-            <a:ext cx="1082348" cy="276999"/>
+            <a:off x="6687982" y="3054999"/>
+            <a:ext cx="559769" cy="276999"/>
           </a:xfrm>
           <a:prstGeom prst="rect">
             <a:avLst/>
@@ -5819,7 +6038,7 @@
                   </a:schemeClr>
                 </a:solidFill>
               </a:rPr>
-              <a:t>2020s – 2030s</a:t>
+              <a:t>2020s</a:t>
             </a:r>
           </a:p>
         </p:txBody>
@@ -5838,8 +6057,8 @@
         </p:nvSpPr>
         <p:spPr>
           <a:xfrm>
-            <a:off x="8455837" y="3777766"/>
-            <a:ext cx="1082348" cy="276999"/>
+            <a:off x="8623688" y="3054920"/>
+            <a:ext cx="559769" cy="276999"/>
           </a:xfrm>
           <a:prstGeom prst="rect">
             <a:avLst/>
@@ -5861,7 +6080,7 @@
                   </a:schemeClr>
                 </a:solidFill>
               </a:rPr>
-              <a:t>2030s – 2040s</a:t>
+              <a:t>2030s</a:t>
             </a:r>
           </a:p>
         </p:txBody>
@@ -5880,8 +6099,8 @@
         </p:nvSpPr>
         <p:spPr>
           <a:xfrm>
-            <a:off x="10479285" y="3777766"/>
-            <a:ext cx="1218732" cy="276999"/>
+            <a:off x="10718634" y="3048861"/>
+            <a:ext cx="559769" cy="276999"/>
           </a:xfrm>
           <a:prstGeom prst="rect">
             <a:avLst/>
@@ -5903,7 +6122,7 @@
                   </a:schemeClr>
                 </a:solidFill>
               </a:rPr>
-              <a:t>2040s &amp; beyond</a:t>
+              <a:t>2040s</a:t>
             </a:r>
           </a:p>
         </p:txBody>
@@ -6023,8 +6242,8 @@
         </p:nvSpPr>
         <p:spPr>
           <a:xfrm>
-            <a:off x="299655" y="1231685"/>
-            <a:ext cx="5865171" cy="3323987"/>
+            <a:off x="299655" y="859545"/>
+            <a:ext cx="5511210" cy="3323987"/>
           </a:xfrm>
           <a:prstGeom prst="rect">
             <a:avLst/>
@@ -6180,7 +6399,7 @@
         </p:nvCxnSpPr>
         <p:spPr>
           <a:xfrm>
-            <a:off x="6381135" y="1155400"/>
+            <a:off x="6076335" y="1519138"/>
             <a:ext cx="0" cy="3819723"/>
           </a:xfrm>
           <a:prstGeom prst="line">
@@ -6216,7 +6435,7 @@
         </p:nvSpPr>
         <p:spPr>
           <a:xfrm>
-            <a:off x="6995423" y="1662572"/>
+            <a:off x="10956107" y="-1086697"/>
             <a:ext cx="4085532" cy="2862322"/>
           </a:xfrm>
           <a:prstGeom prst="rect">
@@ -6364,6 +6583,225 @@
           </a:fontRef>
         </p:style>
       </p:cxnSp>
+      <p:sp>
+        <p:nvSpPr>
+          <p:cNvPr id="2" name="TextBox 1">
+            <a:extLst>
+              <a:ext uri="{FF2B5EF4-FFF2-40B4-BE49-F238E27FC236}">
+                <a16:creationId xmlns:a16="http://schemas.microsoft.com/office/drawing/2014/main" id="{6DD11061-0380-6F48-5D2C-39EF3F759ED1}"/>
+              </a:ext>
+            </a:extLst>
+          </p:cNvPr>
+          <p:cNvSpPr txBox="1"/>
+          <p:nvPr/>
+        </p:nvSpPr>
+        <p:spPr>
+          <a:xfrm>
+            <a:off x="6453052" y="858599"/>
+            <a:ext cx="5405708" cy="5478423"/>
+          </a:xfrm>
+          <a:prstGeom prst="rect">
+            <a:avLst/>
+          </a:prstGeom>
+          <a:noFill/>
+        </p:spPr>
+        <p:txBody>
+          <a:bodyPr wrap="square">
+            <a:spAutoFit/>
+          </a:bodyPr>
+          <a:lstStyle/>
+          <a:p>
+            <a:r>
+              <a:rPr lang="en-US" sz="1400" dirty="0"/>
+              <a:t>In March 2025, </a:t>
+            </a:r>
+            <a:r>
+              <a:rPr lang="en-US" sz="1400" b="1" dirty="0" err="1"/>
+              <a:t>OpenAI</a:t>
+            </a:r>
+            <a:r>
+              <a:rPr lang="en-US" sz="1400" dirty="0"/>
+              <a:t> introduced the Agents SDK, an open-source python framework designed to enhance AI agents with tools and capabilities for autonomous task execution.</a:t>
+            </a:r>
+          </a:p>
+          <a:p>
+            <a:endParaRPr lang="en-US" sz="1400" b="1" dirty="0"/>
+          </a:p>
+          <a:p>
+            <a:r>
+              <a:rPr lang="en-US" sz="1400" b="1" dirty="0"/>
+              <a:t>What are tools?</a:t>
+            </a:r>
+            <a:r>
+              <a:rPr lang="en-US" sz="1400" dirty="0"/>
+              <a:t> </a:t>
+            </a:r>
+          </a:p>
+          <a:p>
+            <a:r>
+              <a:rPr lang="en-US" sz="1400" dirty="0"/>
+              <a:t>In </a:t>
+            </a:r>
+            <a:r>
+              <a:rPr lang="en-US" sz="1400" b="1" dirty="0"/>
+              <a:t>Agentic AI</a:t>
+            </a:r>
+            <a:r>
+              <a:rPr lang="en-US" sz="1400" dirty="0"/>
+              <a:t>, a </a:t>
+            </a:r>
+            <a:r>
+              <a:rPr lang="en-US" sz="1400" b="1" dirty="0"/>
+              <a:t>tool</a:t>
+            </a:r>
+            <a:r>
+              <a:rPr lang="en-US" sz="1400" dirty="0"/>
+              <a:t> refers to an external capability or function that an AI agents can invoke to complete tasks beyond its built-in abilities.</a:t>
+            </a:r>
+          </a:p>
+          <a:p>
+            <a:endParaRPr lang="en-US" sz="1400" dirty="0"/>
+          </a:p>
+          <a:p>
+            <a:r>
+              <a:rPr lang="en-US" sz="1400" b="1" dirty="0"/>
+              <a:t>What are the new capabilities?</a:t>
+            </a:r>
+          </a:p>
+          <a:p>
+            <a:endParaRPr lang="en-US" sz="1400" dirty="0"/>
+          </a:p>
+          <a:p>
+            <a:pPr marL="800100" lvl="1" indent="-342900">
+              <a:buFont typeface="+mj-lt"/>
+              <a:buAutoNum type="arabicPeriod"/>
+            </a:pPr>
+            <a:r>
+              <a:rPr lang="en-US" sz="1400" b="1" dirty="0"/>
+              <a:t>Function Tools</a:t>
+            </a:r>
+            <a:r>
+              <a:rPr lang="en-US" sz="1400" dirty="0"/>
+              <a:t> – Allows the agent to execute predefined functions (e.g., fetching stock prices, running calculations).</a:t>
+            </a:r>
+          </a:p>
+          <a:p>
+            <a:pPr marL="800100" lvl="1" indent="-342900">
+              <a:buFont typeface="+mj-lt"/>
+              <a:buAutoNum type="arabicPeriod"/>
+            </a:pPr>
+            <a:r>
+              <a:rPr lang="en-US" sz="1400" b="1" dirty="0"/>
+              <a:t>Web Search</a:t>
+            </a:r>
+            <a:r>
+              <a:rPr lang="en-US" sz="1400" dirty="0"/>
+              <a:t> – Enables agents to query the internet for real-time information.</a:t>
+            </a:r>
+          </a:p>
+          <a:p>
+            <a:pPr marL="800100" lvl="1" indent="-342900">
+              <a:buFont typeface="+mj-lt"/>
+              <a:buAutoNum type="arabicPeriod"/>
+            </a:pPr>
+            <a:r>
+              <a:rPr lang="en-US" sz="1400" b="1" dirty="0"/>
+              <a:t>File Processing</a:t>
+            </a:r>
+            <a:r>
+              <a:rPr lang="en-US" sz="1400" dirty="0"/>
+              <a:t> – Reads, writes, and extracts structured data from files (CSV, JSON, PDFs, etc.).</a:t>
+            </a:r>
+          </a:p>
+          <a:p>
+            <a:pPr marL="800100" lvl="1" indent="-342900">
+              <a:buFont typeface="+mj-lt"/>
+              <a:buAutoNum type="arabicPeriod"/>
+            </a:pPr>
+            <a:r>
+              <a:rPr lang="en-US" sz="1400" b="1" dirty="0"/>
+              <a:t>Memory &amp; State Management</a:t>
+            </a:r>
+            <a:r>
+              <a:rPr lang="en-US" sz="1400" dirty="0"/>
+              <a:t> – Maintains context across multiple interactions for continuity.</a:t>
+            </a:r>
+          </a:p>
+          <a:p>
+            <a:pPr marL="800100" lvl="1" indent="-342900">
+              <a:buFont typeface="+mj-lt"/>
+              <a:buAutoNum type="arabicPeriod"/>
+            </a:pPr>
+            <a:r>
+              <a:rPr lang="en-US" sz="1400" b="1" dirty="0"/>
+              <a:t>Data Retrieval</a:t>
+            </a:r>
+            <a:r>
+              <a:rPr lang="en-US" sz="1400" dirty="0"/>
+              <a:t> – Queries structured and unstructured data sources (vector databases, SQL, etc.).</a:t>
+            </a:r>
+          </a:p>
+          <a:p>
+            <a:pPr marL="800100" lvl="1" indent="-342900">
+              <a:buFont typeface="+mj-lt"/>
+              <a:buAutoNum type="arabicPeriod"/>
+            </a:pPr>
+            <a:r>
+              <a:rPr lang="en-US" sz="1400" b="1" dirty="0">
+                <a:solidFill>
+                  <a:schemeClr val="tx1">
+                    <a:lumMod val="50000"/>
+                    <a:lumOff val="50000"/>
+                  </a:schemeClr>
+                </a:solidFill>
+              </a:rPr>
+              <a:t>API Integration</a:t>
+            </a:r>
+            <a:r>
+              <a:rPr lang="en-US" sz="1400" dirty="0">
+                <a:solidFill>
+                  <a:schemeClr val="tx1">
+                    <a:lumMod val="50000"/>
+                    <a:lumOff val="50000"/>
+                  </a:schemeClr>
+                </a:solidFill>
+              </a:rPr>
+              <a:t> – Connects to external services (e.g., databases, CRM systems, financial services).</a:t>
+            </a:r>
+          </a:p>
+          <a:p>
+            <a:pPr marL="800100" lvl="1" indent="-342900">
+              <a:buFont typeface="+mj-lt"/>
+              <a:buAutoNum type="arabicPeriod"/>
+            </a:pPr>
+            <a:r>
+              <a:rPr lang="en-US" sz="1400" b="1" dirty="0">
+                <a:solidFill>
+                  <a:schemeClr val="tx1">
+                    <a:lumMod val="50000"/>
+                    <a:lumOff val="50000"/>
+                  </a:schemeClr>
+                </a:solidFill>
+              </a:rPr>
+              <a:t>Code Execution</a:t>
+            </a:r>
+            <a:r>
+              <a:rPr lang="en-US" sz="1400" dirty="0">
+                <a:solidFill>
+                  <a:schemeClr val="tx1">
+                    <a:lumMod val="50000"/>
+                    <a:lumOff val="50000"/>
+                  </a:schemeClr>
+                </a:solidFill>
+              </a:rPr>
+              <a:t> – Runs code snippets in Python, JavaScript, etc., to compute or transform data dynamically.</a:t>
+            </a:r>
+          </a:p>
+          <a:p>
+            <a:endParaRPr lang="en-US" sz="1400" dirty="0"/>
+          </a:p>
+        </p:txBody>
+      </p:sp>
     </p:spTree>
     <p:extLst>
       <p:ext uri="{BB962C8B-B14F-4D97-AF65-F5344CB8AC3E}">
@@ -6408,8 +6846,8 @@
         </p:nvSpPr>
         <p:spPr>
           <a:xfrm>
-            <a:off x="299655" y="84135"/>
-            <a:ext cx="2731645" cy="461665"/>
+            <a:off x="299655" y="74303"/>
+            <a:ext cx="5504905" cy="461665"/>
           </a:xfrm>
           <a:prstGeom prst="rect">
             <a:avLst/>
@@ -6424,7 +6862,7 @@
           <a:p>
             <a:r>
               <a:rPr lang="en-US" sz="2400" dirty="0"/>
-              <a:t>Open AI’s Agent SDK</a:t>
+              <a:t>Agentic AI Setup – A Hypothetical Scenario</a:t>
             </a:r>
           </a:p>
         </p:txBody>
@@ -6443,8 +6881,8 @@
         </p:nvSpPr>
         <p:spPr>
           <a:xfrm>
-            <a:off x="346275" y="997565"/>
-            <a:ext cx="11499449" cy="4585871"/>
+            <a:off x="8766813" y="4472308"/>
+            <a:ext cx="2545830" cy="2031325"/>
           </a:xfrm>
           <a:prstGeom prst="rect">
             <a:avLst/>
@@ -6457,203 +6895,54 @@
           </a:bodyPr>
           <a:lstStyle/>
           <a:p>
-            <a:r>
-              <a:rPr lang="en-US" dirty="0"/>
-              <a:t>In March 2025, </a:t>
-            </a:r>
-            <a:r>
-              <a:rPr lang="en-US" dirty="0" err="1"/>
-              <a:t>OpenAI</a:t>
-            </a:r>
-            <a:r>
-              <a:rPr lang="en-US" dirty="0"/>
-              <a:t> introduced the Agents SDK, an open-source python framework designed to enhance AI agents with tools and capabilities for autonomous task execution.</a:t>
-            </a:r>
-          </a:p>
-          <a:p>
-            <a:endParaRPr lang="en-US" b="1" dirty="0"/>
-          </a:p>
-          <a:p>
-            <a:r>
-              <a:rPr lang="en-US" b="1" dirty="0"/>
-              <a:t>What are tools?</a:t>
-            </a:r>
-            <a:r>
-              <a:rPr lang="en-US" dirty="0"/>
-              <a:t> </a:t>
-            </a:r>
-          </a:p>
-          <a:p>
-            <a:r>
-              <a:rPr lang="en-US" dirty="0"/>
-              <a:t>In </a:t>
-            </a:r>
-            <a:r>
-              <a:rPr lang="en-US" b="1" dirty="0"/>
-              <a:t>Agentic AI</a:t>
-            </a:r>
-            <a:r>
-              <a:rPr lang="en-US" dirty="0"/>
-              <a:t>, a </a:t>
-            </a:r>
-            <a:r>
-              <a:rPr lang="en-US" b="1" dirty="0"/>
-              <a:t>tool</a:t>
-            </a:r>
-            <a:r>
-              <a:rPr lang="en-US" dirty="0"/>
-              <a:t> refers to an external capability or function that an AI agents can invoke to complete tasks beyond its built-in abilities.</a:t>
-            </a:r>
-          </a:p>
-          <a:p>
-            <a:endParaRPr lang="en-US" dirty="0"/>
-          </a:p>
-          <a:p>
-            <a:r>
-              <a:rPr lang="en-US" b="1" dirty="0"/>
-              <a:t>What are the new capabilities?</a:t>
-            </a:r>
-          </a:p>
-          <a:p>
-            <a:endParaRPr lang="en-US" dirty="0"/>
-          </a:p>
-          <a:p>
-            <a:pPr marL="800100" lvl="1" indent="-342900">
-              <a:buFont typeface="+mj-lt"/>
-              <a:buAutoNum type="arabicPeriod"/>
+            <a:pPr marL="285750" indent="-285750">
+              <a:buFont typeface="Arial" panose="020B0604020202020204" pitchFamily="34" charset="0"/>
+              <a:buChar char="•"/>
             </a:pPr>
             <a:r>
-              <a:rPr lang="en-US" sz="1600" b="1" dirty="0"/>
-              <a:t>Function Tools</a:t>
-            </a:r>
-            <a:r>
-              <a:rPr lang="en-US" sz="1600" dirty="0"/>
-              <a:t> – Allows the agent to execute predefined functions (e.g., fetching stock prices, running calculations).</a:t>
-            </a:r>
-          </a:p>
-          <a:p>
-            <a:pPr marL="800100" lvl="1" indent="-342900">
-              <a:buFont typeface="+mj-lt"/>
-              <a:buAutoNum type="arabicPeriod"/>
+              <a:rPr lang="en-US" sz="1400" dirty="0"/>
+              <a:t>A </a:t>
+            </a:r>
+            <a:r>
+              <a:rPr lang="en-US" sz="1400" b="1" dirty="0"/>
+              <a:t>software engineer</a:t>
+            </a:r>
+            <a:r>
+              <a:rPr lang="en-US" sz="1400" dirty="0"/>
+              <a:t> to analyze source code, document logic, and execute technical tasks.</a:t>
+            </a:r>
+          </a:p>
+          <a:p>
+            <a:pPr marL="742950" lvl="1" indent="-285750">
+              <a:buFont typeface="Arial" panose="020B0604020202020204" pitchFamily="34" charset="0"/>
+              <a:buChar char="•"/>
             </a:pPr>
             <a:r>
-              <a:rPr lang="en-US" sz="1600" b="1" dirty="0"/>
-              <a:t>Web Search</a:t>
-            </a:r>
-            <a:r>
-              <a:rPr lang="en-US" sz="1600" dirty="0"/>
-              <a:t> – Enables agents to query the internet for real-time information.</a:t>
-            </a:r>
-          </a:p>
-          <a:p>
-            <a:pPr marL="800100" lvl="1" indent="-342900">
-              <a:buFont typeface="+mj-lt"/>
-              <a:buAutoNum type="arabicPeriod"/>
+              <a:rPr lang="en-US" sz="1400" dirty="0"/>
+              <a:t>ADF/JSON File analysis</a:t>
+            </a:r>
+          </a:p>
+          <a:p>
+            <a:pPr marL="742950" lvl="1" indent="-285750">
+              <a:buFont typeface="Arial" panose="020B0604020202020204" pitchFamily="34" charset="0"/>
+              <a:buChar char="•"/>
             </a:pPr>
             <a:r>
-              <a:rPr lang="en-US" sz="1600" b="1" dirty="0"/>
-              <a:t>File Processing</a:t>
-            </a:r>
-            <a:r>
-              <a:rPr lang="en-US" sz="1600" dirty="0"/>
-              <a:t> – Reads, writes, and extracts structured data from files (CSV, JSON, PDFs, etc.).</a:t>
-            </a:r>
-          </a:p>
-          <a:p>
-            <a:pPr marL="800100" lvl="1" indent="-342900">
-              <a:buFont typeface="+mj-lt"/>
-              <a:buAutoNum type="arabicPeriod"/>
-            </a:pPr>
-            <a:r>
-              <a:rPr lang="en-US" sz="1600" b="1" dirty="0"/>
-              <a:t>Memory &amp; State Management</a:t>
-            </a:r>
-            <a:r>
-              <a:rPr lang="en-US" sz="1600" dirty="0"/>
-              <a:t> – Maintains context across multiple interactions for continuity.</a:t>
-            </a:r>
-          </a:p>
-          <a:p>
-            <a:pPr marL="800100" lvl="1" indent="-342900">
-              <a:buFont typeface="+mj-lt"/>
-              <a:buAutoNum type="arabicPeriod"/>
-            </a:pPr>
-            <a:r>
-              <a:rPr lang="en-US" sz="1600" b="1" dirty="0"/>
-              <a:t>Data Retrieval</a:t>
-            </a:r>
-            <a:r>
-              <a:rPr lang="en-US" sz="1600" dirty="0"/>
-              <a:t> – Queries structured and unstructured data sources (vector databases, SQL, etc.).</a:t>
-            </a:r>
-          </a:p>
-          <a:p>
-            <a:pPr marL="800100" lvl="1" indent="-342900">
-              <a:buFont typeface="+mj-lt"/>
-              <a:buAutoNum type="arabicPeriod"/>
-            </a:pPr>
-            <a:r>
-              <a:rPr lang="en-US" sz="1600" b="1" dirty="0">
-                <a:solidFill>
-                  <a:schemeClr val="tx1">
-                    <a:lumMod val="50000"/>
-                    <a:lumOff val="50000"/>
-                  </a:schemeClr>
-                </a:solidFill>
-              </a:rPr>
-              <a:t>API Integration</a:t>
-            </a:r>
-            <a:r>
-              <a:rPr lang="en-US" sz="1600" dirty="0">
-                <a:solidFill>
-                  <a:schemeClr val="tx1">
-                    <a:lumMod val="50000"/>
-                    <a:lumOff val="50000"/>
-                  </a:schemeClr>
-                </a:solidFill>
-              </a:rPr>
-              <a:t> – Connects to external services (e.g., databases, CRM systems, financial services).</a:t>
-            </a:r>
-          </a:p>
-          <a:p>
-            <a:pPr marL="800100" lvl="1" indent="-342900">
-              <a:buFont typeface="+mj-lt"/>
-              <a:buAutoNum type="arabicPeriod"/>
-            </a:pPr>
-            <a:r>
-              <a:rPr lang="en-US" sz="1600" b="1" dirty="0">
-                <a:solidFill>
-                  <a:schemeClr val="tx1">
-                    <a:lumMod val="50000"/>
-                    <a:lumOff val="50000"/>
-                  </a:schemeClr>
-                </a:solidFill>
-              </a:rPr>
-              <a:t>Code Execution</a:t>
-            </a:r>
-            <a:r>
-              <a:rPr lang="en-US" sz="1600" dirty="0">
-                <a:solidFill>
-                  <a:schemeClr val="tx1">
-                    <a:lumMod val="50000"/>
-                    <a:lumOff val="50000"/>
-                  </a:schemeClr>
-                </a:solidFill>
-              </a:rPr>
-              <a:t> – Runs code snippets in Python, JavaScript, etc., to compute or transform data dynamically.</a:t>
-            </a:r>
-          </a:p>
-          <a:p>
-            <a:endParaRPr lang="en-US" dirty="0"/>
+              <a:rPr lang="en-US" sz="1400" dirty="0"/>
+              <a:t>Snowflake/Stored-procedure analysis</a:t>
+            </a:r>
+          </a:p>
+          <a:p>
+            <a:endParaRPr lang="en-US" sz="1400" b="1" dirty="0"/>
           </a:p>
         </p:txBody>
       </p:sp>
       <p:cxnSp>
         <p:nvCxnSpPr>
-          <p:cNvPr id="7" name="Straight Connector 6">
-            <a:extLst>
-              <a:ext uri="{FF2B5EF4-FFF2-40B4-BE49-F238E27FC236}">
-                <a16:creationId xmlns:a16="http://schemas.microsoft.com/office/drawing/2014/main" id="{EB543984-F154-B014-F882-2E08A841C67A}"/>
+          <p:cNvPr id="2" name="Straight Connector 1">
+            <a:extLst>
+              <a:ext uri="{FF2B5EF4-FFF2-40B4-BE49-F238E27FC236}">
+                <a16:creationId xmlns:a16="http://schemas.microsoft.com/office/drawing/2014/main" id="{22E1BF60-C091-F918-A508-C0CD2544E876}"/>
               </a:ext>
             </a:extLst>
           </p:cNvPr>
@@ -6662,7 +6951,7 @@
         </p:nvCxnSpPr>
         <p:spPr>
           <a:xfrm>
-            <a:off x="432619" y="555632"/>
+            <a:off x="432619" y="545800"/>
             <a:ext cx="11759381" cy="0"/>
           </a:xfrm>
           <a:prstGeom prst="line">
@@ -6684,10 +6973,617 @@
           </a:fontRef>
         </p:style>
       </p:cxnSp>
+      <p:sp>
+        <p:nvSpPr>
+          <p:cNvPr id="3" name="Rounded Rectangle 2">
+            <a:extLst>
+              <a:ext uri="{FF2B5EF4-FFF2-40B4-BE49-F238E27FC236}">
+                <a16:creationId xmlns:a16="http://schemas.microsoft.com/office/drawing/2014/main" id="{29183193-D05D-D1D0-1C3E-C757F541B166}"/>
+              </a:ext>
+            </a:extLst>
+          </p:cNvPr>
+          <p:cNvSpPr/>
+          <p:nvPr/>
+        </p:nvSpPr>
+        <p:spPr>
+          <a:xfrm>
+            <a:off x="5517605" y="861934"/>
+            <a:ext cx="1616846" cy="584617"/>
+          </a:xfrm>
+          <a:prstGeom prst="roundRect">
+            <a:avLst/>
+          </a:prstGeom>
+        </p:spPr>
+        <p:style>
+          <a:lnRef idx="2">
+            <a:schemeClr val="accent1">
+              <a:shade val="15000"/>
+            </a:schemeClr>
+          </a:lnRef>
+          <a:fillRef idx="1">
+            <a:schemeClr val="accent1"/>
+          </a:fillRef>
+          <a:effectRef idx="0">
+            <a:schemeClr val="accent1"/>
+          </a:effectRef>
+          <a:fontRef idx="minor">
+            <a:schemeClr val="lt1"/>
+          </a:fontRef>
+        </p:style>
+        <p:txBody>
+          <a:bodyPr rtlCol="0" anchor="ctr"/>
+          <a:lstStyle/>
+          <a:p>
+            <a:pPr algn="ctr"/>
+            <a:r>
+              <a:rPr lang="en-US" sz="1600" dirty="0"/>
+              <a:t>Auto Trader</a:t>
+            </a:r>
+          </a:p>
+        </p:txBody>
+      </p:sp>
+      <p:sp>
+        <p:nvSpPr>
+          <p:cNvPr id="5" name="Rounded Rectangle 4">
+            <a:extLst>
+              <a:ext uri="{FF2B5EF4-FFF2-40B4-BE49-F238E27FC236}">
+                <a16:creationId xmlns:a16="http://schemas.microsoft.com/office/drawing/2014/main" id="{AE830F09-2BA5-D787-AC4F-739E387459BC}"/>
+              </a:ext>
+            </a:extLst>
+          </p:cNvPr>
+          <p:cNvSpPr/>
+          <p:nvPr/>
+        </p:nvSpPr>
+        <p:spPr>
+          <a:xfrm>
+            <a:off x="1751060" y="2927274"/>
+            <a:ext cx="1722536" cy="532150"/>
+          </a:xfrm>
+          <a:prstGeom prst="roundRect">
+            <a:avLst/>
+          </a:prstGeom>
+        </p:spPr>
+        <p:style>
+          <a:lnRef idx="2">
+            <a:schemeClr val="accent2">
+              <a:shade val="15000"/>
+            </a:schemeClr>
+          </a:lnRef>
+          <a:fillRef idx="1">
+            <a:schemeClr val="accent2"/>
+          </a:fillRef>
+          <a:effectRef idx="0">
+            <a:schemeClr val="accent2"/>
+          </a:effectRef>
+          <a:fontRef idx="minor">
+            <a:schemeClr val="lt1"/>
+          </a:fontRef>
+        </p:style>
+        <p:txBody>
+          <a:bodyPr rtlCol="0" anchor="ctr"/>
+          <a:lstStyle/>
+          <a:p>
+            <a:pPr algn="ctr"/>
+            <a:r>
+              <a:rPr lang="en-US" sz="1400" b="1" dirty="0"/>
+              <a:t>Sales Agent</a:t>
+            </a:r>
+          </a:p>
+        </p:txBody>
+      </p:sp>
+      <p:sp>
+        <p:nvSpPr>
+          <p:cNvPr id="7" name="Rounded Rectangle 6">
+            <a:extLst>
+              <a:ext uri="{FF2B5EF4-FFF2-40B4-BE49-F238E27FC236}">
+                <a16:creationId xmlns:a16="http://schemas.microsoft.com/office/drawing/2014/main" id="{B636C9CE-9EFC-E222-A5CA-D1507AA8F2BA}"/>
+              </a:ext>
+            </a:extLst>
+          </p:cNvPr>
+          <p:cNvSpPr/>
+          <p:nvPr/>
+        </p:nvSpPr>
+        <p:spPr>
+          <a:xfrm>
+            <a:off x="5466358" y="2927274"/>
+            <a:ext cx="1722536" cy="532150"/>
+          </a:xfrm>
+          <a:prstGeom prst="roundRect">
+            <a:avLst/>
+          </a:prstGeom>
+        </p:spPr>
+        <p:style>
+          <a:lnRef idx="2">
+            <a:schemeClr val="accent4">
+              <a:shade val="15000"/>
+            </a:schemeClr>
+          </a:lnRef>
+          <a:fillRef idx="1">
+            <a:schemeClr val="accent4"/>
+          </a:fillRef>
+          <a:effectRef idx="0">
+            <a:schemeClr val="accent4"/>
+          </a:effectRef>
+          <a:fontRef idx="minor">
+            <a:schemeClr val="lt1"/>
+          </a:fontRef>
+        </p:style>
+        <p:txBody>
+          <a:bodyPr rtlCol="0" anchor="ctr"/>
+          <a:lstStyle/>
+          <a:p>
+            <a:pPr algn="ctr"/>
+            <a:r>
+              <a:rPr lang="en-US" sz="1400" b="1" dirty="0"/>
+              <a:t>Financial Analyst</a:t>
+            </a:r>
+          </a:p>
+        </p:txBody>
+      </p:sp>
+      <p:sp>
+        <p:nvSpPr>
+          <p:cNvPr id="8" name="Rounded Rectangle 7">
+            <a:extLst>
+              <a:ext uri="{FF2B5EF4-FFF2-40B4-BE49-F238E27FC236}">
+                <a16:creationId xmlns:a16="http://schemas.microsoft.com/office/drawing/2014/main" id="{920EF24E-B36B-4F64-CC1D-2020959922C3}"/>
+              </a:ext>
+            </a:extLst>
+          </p:cNvPr>
+          <p:cNvSpPr/>
+          <p:nvPr/>
+        </p:nvSpPr>
+        <p:spPr>
+          <a:xfrm>
+            <a:off x="9178460" y="2927274"/>
+            <a:ext cx="1722536" cy="532150"/>
+          </a:xfrm>
+          <a:prstGeom prst="roundRect">
+            <a:avLst/>
+          </a:prstGeom>
+        </p:spPr>
+        <p:style>
+          <a:lnRef idx="2">
+            <a:schemeClr val="accent6">
+              <a:shade val="15000"/>
+            </a:schemeClr>
+          </a:lnRef>
+          <a:fillRef idx="1">
+            <a:schemeClr val="accent6"/>
+          </a:fillRef>
+          <a:effectRef idx="0">
+            <a:schemeClr val="accent6"/>
+          </a:effectRef>
+          <a:fontRef idx="minor">
+            <a:schemeClr val="lt1"/>
+          </a:fontRef>
+        </p:style>
+        <p:txBody>
+          <a:bodyPr rtlCol="0" anchor="ctr"/>
+          <a:lstStyle/>
+          <a:p>
+            <a:pPr algn="ctr"/>
+            <a:r>
+              <a:rPr lang="en-US" sz="1400" b="1" dirty="0"/>
+              <a:t>Engineer</a:t>
+            </a:r>
+          </a:p>
+        </p:txBody>
+      </p:sp>
+      <p:cxnSp>
+        <p:nvCxnSpPr>
+          <p:cNvPr id="10" name="Elbow Connector 9">
+            <a:extLst>
+              <a:ext uri="{FF2B5EF4-FFF2-40B4-BE49-F238E27FC236}">
+                <a16:creationId xmlns:a16="http://schemas.microsoft.com/office/drawing/2014/main" id="{6B3DA53C-6856-B923-0FC0-3F819C4BCCDB}"/>
+              </a:ext>
+            </a:extLst>
+          </p:cNvPr>
+          <p:cNvCxnSpPr>
+            <a:cxnSpLocks/>
+            <a:stCxn id="3" idx="2"/>
+            <a:endCxn id="5" idx="0"/>
+          </p:cNvCxnSpPr>
+          <p:nvPr/>
+        </p:nvCxnSpPr>
+        <p:spPr>
+          <a:xfrm rot="5400000">
+            <a:off x="3728817" y="330062"/>
+            <a:ext cx="1480723" cy="3713700"/>
+          </a:xfrm>
+          <a:prstGeom prst="bentConnector3">
+            <a:avLst/>
+          </a:prstGeom>
+          <a:ln>
+            <a:tailEnd type="triangle"/>
+          </a:ln>
+        </p:spPr>
+        <p:style>
+          <a:lnRef idx="1">
+            <a:schemeClr val="accent1"/>
+          </a:lnRef>
+          <a:fillRef idx="0">
+            <a:schemeClr val="accent1"/>
+          </a:fillRef>
+          <a:effectRef idx="0">
+            <a:schemeClr val="accent1"/>
+          </a:effectRef>
+          <a:fontRef idx="minor">
+            <a:schemeClr val="tx1"/>
+          </a:fontRef>
+        </p:style>
+      </p:cxnSp>
+      <p:cxnSp>
+        <p:nvCxnSpPr>
+          <p:cNvPr id="11" name="Elbow Connector 10">
+            <a:extLst>
+              <a:ext uri="{FF2B5EF4-FFF2-40B4-BE49-F238E27FC236}">
+                <a16:creationId xmlns:a16="http://schemas.microsoft.com/office/drawing/2014/main" id="{44BD70ED-2DC8-D8CC-20ED-FDDE8CE83543}"/>
+              </a:ext>
+            </a:extLst>
+          </p:cNvPr>
+          <p:cNvCxnSpPr>
+            <a:cxnSpLocks/>
+            <a:stCxn id="3" idx="2"/>
+            <a:endCxn id="7" idx="0"/>
+          </p:cNvCxnSpPr>
+          <p:nvPr/>
+        </p:nvCxnSpPr>
+        <p:spPr>
+          <a:xfrm rot="16200000" flipH="1">
+            <a:off x="5586466" y="2186113"/>
+            <a:ext cx="1480723" cy="1598"/>
+          </a:xfrm>
+          <a:prstGeom prst="bentConnector3">
+            <a:avLst>
+              <a:gd name="adj1" fmla="val 50000"/>
+            </a:avLst>
+          </a:prstGeom>
+          <a:ln>
+            <a:tailEnd type="triangle"/>
+          </a:ln>
+        </p:spPr>
+        <p:style>
+          <a:lnRef idx="1">
+            <a:schemeClr val="accent1"/>
+          </a:lnRef>
+          <a:fillRef idx="0">
+            <a:schemeClr val="accent1"/>
+          </a:fillRef>
+          <a:effectRef idx="0">
+            <a:schemeClr val="accent1"/>
+          </a:effectRef>
+          <a:fontRef idx="minor">
+            <a:schemeClr val="tx1"/>
+          </a:fontRef>
+        </p:style>
+      </p:cxnSp>
+      <p:cxnSp>
+        <p:nvCxnSpPr>
+          <p:cNvPr id="14" name="Elbow Connector 13">
+            <a:extLst>
+              <a:ext uri="{FF2B5EF4-FFF2-40B4-BE49-F238E27FC236}">
+                <a16:creationId xmlns:a16="http://schemas.microsoft.com/office/drawing/2014/main" id="{7537D570-9B42-577D-3ECF-5036DC488D94}"/>
+              </a:ext>
+            </a:extLst>
+          </p:cNvPr>
+          <p:cNvCxnSpPr>
+            <a:cxnSpLocks/>
+            <a:stCxn id="3" idx="2"/>
+            <a:endCxn id="8" idx="0"/>
+          </p:cNvCxnSpPr>
+          <p:nvPr/>
+        </p:nvCxnSpPr>
+        <p:spPr>
+          <a:xfrm rot="16200000" flipH="1">
+            <a:off x="7442517" y="330062"/>
+            <a:ext cx="1480723" cy="3713700"/>
+          </a:xfrm>
+          <a:prstGeom prst="bentConnector3">
+            <a:avLst>
+              <a:gd name="adj1" fmla="val 50000"/>
+            </a:avLst>
+          </a:prstGeom>
+          <a:ln>
+            <a:tailEnd type="triangle"/>
+          </a:ln>
+        </p:spPr>
+        <p:style>
+          <a:lnRef idx="1">
+            <a:schemeClr val="accent1"/>
+          </a:lnRef>
+          <a:fillRef idx="0">
+            <a:schemeClr val="accent1"/>
+          </a:fillRef>
+          <a:effectRef idx="0">
+            <a:schemeClr val="accent1"/>
+          </a:effectRef>
+          <a:fontRef idx="minor">
+            <a:schemeClr val="tx1"/>
+          </a:fontRef>
+        </p:style>
+      </p:cxnSp>
+      <p:sp>
+        <p:nvSpPr>
+          <p:cNvPr id="18" name="TextBox 17">
+            <a:extLst>
+              <a:ext uri="{FF2B5EF4-FFF2-40B4-BE49-F238E27FC236}">
+                <a16:creationId xmlns:a16="http://schemas.microsoft.com/office/drawing/2014/main" id="{E244444A-9D00-1A66-2EFE-3292C1E5A4F3}"/>
+              </a:ext>
+            </a:extLst>
+          </p:cNvPr>
+          <p:cNvSpPr txBox="1"/>
+          <p:nvPr/>
+        </p:nvSpPr>
+        <p:spPr>
+          <a:xfrm>
+            <a:off x="1220942" y="4472309"/>
+            <a:ext cx="2782771" cy="2031325"/>
+          </a:xfrm>
+          <a:prstGeom prst="rect">
+            <a:avLst/>
+          </a:prstGeom>
+          <a:noFill/>
+        </p:spPr>
+        <p:txBody>
+          <a:bodyPr wrap="square">
+            <a:spAutoFit/>
+          </a:bodyPr>
+          <a:lstStyle/>
+          <a:p>
+            <a:pPr marL="285750" indent="-285750">
+              <a:buFont typeface="Arial" panose="020B0604020202020204" pitchFamily="34" charset="0"/>
+              <a:buChar char="•"/>
+            </a:pPr>
+            <a:r>
+              <a:rPr lang="en-US" sz="1400" dirty="0"/>
+              <a:t>A </a:t>
+            </a:r>
+            <a:r>
+              <a:rPr lang="en-US" sz="1400" b="1" dirty="0"/>
+              <a:t>sales representative</a:t>
+            </a:r>
+            <a:r>
+              <a:rPr lang="en-US" sz="1400" dirty="0"/>
+              <a:t> to engage with customers and provide details about available inventory.</a:t>
+            </a:r>
+          </a:p>
+          <a:p>
+            <a:pPr marL="285750" indent="-285750">
+              <a:buFont typeface="Arial" panose="020B0604020202020204" pitchFamily="34" charset="0"/>
+              <a:buChar char="•"/>
+            </a:pPr>
+            <a:endParaRPr lang="en-US" sz="1400" dirty="0"/>
+          </a:p>
+          <a:p>
+            <a:pPr marL="285750" indent="-285750">
+              <a:buFont typeface="Arial" panose="020B0604020202020204" pitchFamily="34" charset="0"/>
+              <a:buChar char="•"/>
+            </a:pPr>
+            <a:r>
+              <a:rPr lang="en-US" sz="1400" dirty="0"/>
+              <a:t>An </a:t>
+            </a:r>
+            <a:r>
+              <a:rPr lang="en-US" sz="1400" b="1" dirty="0"/>
+              <a:t>agent</a:t>
+            </a:r>
+            <a:r>
+              <a:rPr lang="en-US" sz="1400" dirty="0"/>
+              <a:t> that can retrieve additional insights beyond inventory through </a:t>
+            </a:r>
+            <a:r>
+              <a:rPr lang="en-US" sz="1400" b="1" dirty="0"/>
+              <a:t>web searches</a:t>
+            </a:r>
+            <a:r>
+              <a:rPr lang="en-US" sz="1400" dirty="0"/>
+              <a:t>.</a:t>
+            </a:r>
+          </a:p>
+        </p:txBody>
+      </p:sp>
+      <p:sp>
+        <p:nvSpPr>
+          <p:cNvPr id="20" name="TextBox 19">
+            <a:extLst>
+              <a:ext uri="{FF2B5EF4-FFF2-40B4-BE49-F238E27FC236}">
+                <a16:creationId xmlns:a16="http://schemas.microsoft.com/office/drawing/2014/main" id="{388C5C6E-8D7D-BA76-8CEC-F0A42EFBD4A1}"/>
+              </a:ext>
+            </a:extLst>
+          </p:cNvPr>
+          <p:cNvSpPr txBox="1"/>
+          <p:nvPr/>
+        </p:nvSpPr>
+        <p:spPr>
+          <a:xfrm>
+            <a:off x="4862613" y="4472309"/>
+            <a:ext cx="2926830" cy="1815882"/>
+          </a:xfrm>
+          <a:prstGeom prst="rect">
+            <a:avLst/>
+          </a:prstGeom>
+          <a:noFill/>
+        </p:spPr>
+        <p:txBody>
+          <a:bodyPr wrap="square">
+            <a:spAutoFit/>
+          </a:bodyPr>
+          <a:lstStyle/>
+          <a:p>
+            <a:pPr marL="285750" indent="-285750">
+              <a:buFont typeface="Arial" panose="020B0604020202020204" pitchFamily="34" charset="0"/>
+              <a:buChar char="•"/>
+            </a:pPr>
+            <a:r>
+              <a:rPr lang="en-US" sz="1400" dirty="0"/>
+              <a:t>A </a:t>
+            </a:r>
+            <a:r>
+              <a:rPr lang="en-US" sz="1400" b="1" dirty="0"/>
+              <a:t>financial analyst</a:t>
+            </a:r>
+            <a:r>
+              <a:rPr lang="en-US" sz="1400" dirty="0"/>
+              <a:t> to evaluate multi-year sales data and generate sales forecasts.</a:t>
+            </a:r>
+          </a:p>
+          <a:p>
+            <a:pPr marL="285750" indent="-285750">
+              <a:buFont typeface="Arial" panose="020B0604020202020204" pitchFamily="34" charset="0"/>
+              <a:buChar char="•"/>
+            </a:pPr>
+            <a:endParaRPr lang="en-US" sz="1400" dirty="0"/>
+          </a:p>
+          <a:p>
+            <a:pPr marL="285750" indent="-285750">
+              <a:buFont typeface="Arial" panose="020B0604020202020204" pitchFamily="34" charset="0"/>
+              <a:buChar char="•"/>
+            </a:pPr>
+            <a:r>
+              <a:rPr lang="en-US" sz="1400" dirty="0"/>
+              <a:t>An </a:t>
+            </a:r>
+            <a:r>
+              <a:rPr lang="en-US" sz="1400" b="1" dirty="0"/>
+              <a:t>executive assistant</a:t>
+            </a:r>
+            <a:r>
+              <a:rPr lang="en-US" sz="1400" dirty="0"/>
+              <a:t> responsible for managing communications, including sending emails.</a:t>
+            </a:r>
+          </a:p>
+        </p:txBody>
+      </p:sp>
+      <p:sp>
+        <p:nvSpPr>
+          <p:cNvPr id="21" name="TextBox 20">
+            <a:extLst>
+              <a:ext uri="{FF2B5EF4-FFF2-40B4-BE49-F238E27FC236}">
+                <a16:creationId xmlns:a16="http://schemas.microsoft.com/office/drawing/2014/main" id="{8E055AB3-BEFA-122C-EFE6-CEB2BCE860AB}"/>
+              </a:ext>
+            </a:extLst>
+          </p:cNvPr>
+          <p:cNvSpPr txBox="1"/>
+          <p:nvPr/>
+        </p:nvSpPr>
+        <p:spPr>
+          <a:xfrm rot="16200000">
+            <a:off x="-111167" y="1212361"/>
+            <a:ext cx="1180219" cy="276999"/>
+          </a:xfrm>
+          <a:prstGeom prst="rect">
+            <a:avLst/>
+          </a:prstGeom>
+          <a:solidFill>
+            <a:schemeClr val="tx2"/>
+          </a:solidFill>
+        </p:spPr>
+        <p:txBody>
+          <a:bodyPr wrap="square" rtlCol="0">
+            <a:spAutoFit/>
+          </a:bodyPr>
+          <a:lstStyle/>
+          <a:p>
+            <a:pPr algn="ctr"/>
+            <a:r>
+              <a:rPr lang="en-US" sz="1200" dirty="0">
+                <a:solidFill>
+                  <a:schemeClr val="bg1"/>
+                </a:solidFill>
+              </a:rPr>
+              <a:t>Organization</a:t>
+            </a:r>
+          </a:p>
+        </p:txBody>
+      </p:sp>
+      <p:sp>
+        <p:nvSpPr>
+          <p:cNvPr id="22" name="TextBox 21">
+            <a:extLst>
+              <a:ext uri="{FF2B5EF4-FFF2-40B4-BE49-F238E27FC236}">
+                <a16:creationId xmlns:a16="http://schemas.microsoft.com/office/drawing/2014/main" id="{D474AA23-12C6-1B14-6121-97E1116540E3}"/>
+              </a:ext>
+            </a:extLst>
+          </p:cNvPr>
+          <p:cNvSpPr txBox="1"/>
+          <p:nvPr/>
+        </p:nvSpPr>
+        <p:spPr>
+          <a:xfrm rot="16200000">
+            <a:off x="-105787" y="3055608"/>
+            <a:ext cx="1180219" cy="276999"/>
+          </a:xfrm>
+          <a:prstGeom prst="rect">
+            <a:avLst/>
+          </a:prstGeom>
+          <a:solidFill>
+            <a:schemeClr val="tx2"/>
+          </a:solidFill>
+        </p:spPr>
+        <p:txBody>
+          <a:bodyPr wrap="square" rtlCol="0">
+            <a:spAutoFit/>
+          </a:bodyPr>
+          <a:lstStyle/>
+          <a:p>
+            <a:pPr algn="ctr"/>
+            <a:r>
+              <a:rPr lang="en-US" sz="1200" dirty="0">
+                <a:solidFill>
+                  <a:schemeClr val="bg1"/>
+                </a:solidFill>
+              </a:rPr>
+              <a:t>Persona</a:t>
+            </a:r>
+          </a:p>
+        </p:txBody>
+      </p:sp>
+      <p:sp>
+        <p:nvSpPr>
+          <p:cNvPr id="23" name="TextBox 22">
+            <a:extLst>
+              <a:ext uri="{FF2B5EF4-FFF2-40B4-BE49-F238E27FC236}">
+                <a16:creationId xmlns:a16="http://schemas.microsoft.com/office/drawing/2014/main" id="{7315556D-1F9B-9DBE-A18E-4E70CCD9C91A}"/>
+              </a:ext>
+            </a:extLst>
+          </p:cNvPr>
+          <p:cNvSpPr txBox="1"/>
+          <p:nvPr/>
+        </p:nvSpPr>
+        <p:spPr>
+          <a:xfrm rot="16200000">
+            <a:off x="-111166" y="5368641"/>
+            <a:ext cx="1180218" cy="276999"/>
+          </a:xfrm>
+          <a:prstGeom prst="rect">
+            <a:avLst/>
+          </a:prstGeom>
+          <a:solidFill>
+            <a:schemeClr val="tx2"/>
+          </a:solidFill>
+        </p:spPr>
+        <p:txBody>
+          <a:bodyPr wrap="square" rtlCol="0">
+            <a:spAutoFit/>
+          </a:bodyPr>
+          <a:lstStyle/>
+          <a:p>
+            <a:pPr algn="ctr"/>
+            <a:r>
+              <a:rPr lang="en-US" sz="1200" dirty="0">
+                <a:solidFill>
+                  <a:schemeClr val="bg1"/>
+                </a:solidFill>
+              </a:rPr>
+              <a:t>Responsibilities</a:t>
+            </a:r>
+          </a:p>
+        </p:txBody>
+      </p:sp>
     </p:spTree>
     <p:extLst>
       <p:ext uri="{BB962C8B-B14F-4D97-AF65-F5344CB8AC3E}">
-        <p14:creationId xmlns:p14="http://schemas.microsoft.com/office/powerpoint/2010/main" val="2931826500"/>
+        <p14:creationId xmlns:p14="http://schemas.microsoft.com/office/powerpoint/2010/main" val="3676540794"/>
       </p:ext>
     </p:extLst>
   </p:cSld>
@@ -6728,8 +7624,8 @@
         </p:nvSpPr>
         <p:spPr>
           <a:xfrm>
-            <a:off x="299655" y="74303"/>
-            <a:ext cx="1969450" cy="461665"/>
+            <a:off x="378314" y="2719180"/>
+            <a:ext cx="2860783" cy="461665"/>
           </a:xfrm>
           <a:prstGeom prst="rect">
             <a:avLst/>
@@ -6744,658 +7640,7 @@
           <a:p>
             <a:r>
               <a:rPr lang="en-US" sz="2400" dirty="0"/>
-              <a:t>DEMO - Scope</a:t>
-            </a:r>
-          </a:p>
-        </p:txBody>
-      </p:sp>
-      <p:sp>
-        <p:nvSpPr>
-          <p:cNvPr id="6" name="TextBox 5">
-            <a:extLst>
-              <a:ext uri="{FF2B5EF4-FFF2-40B4-BE49-F238E27FC236}">
-                <a16:creationId xmlns:a16="http://schemas.microsoft.com/office/drawing/2014/main" id="{C7EEF8DF-D3BE-76CD-DA64-DA819E5DA002}"/>
-              </a:ext>
-            </a:extLst>
-          </p:cNvPr>
-          <p:cNvSpPr txBox="1"/>
-          <p:nvPr/>
-        </p:nvSpPr>
-        <p:spPr>
-          <a:xfrm>
-            <a:off x="9518754" y="3050659"/>
-            <a:ext cx="2545830" cy="3139321"/>
-          </a:xfrm>
-          <a:prstGeom prst="rect">
-            <a:avLst/>
-          </a:prstGeom>
-          <a:noFill/>
-        </p:spPr>
-        <p:txBody>
-          <a:bodyPr wrap="square">
-            <a:spAutoFit/>
-          </a:bodyPr>
-          <a:lstStyle/>
-          <a:p>
-            <a:pPr marL="285750" indent="-285750">
-              <a:buFont typeface="Arial" panose="020B0604020202020204" pitchFamily="34" charset="0"/>
-              <a:buChar char="•"/>
-            </a:pPr>
-            <a:r>
-              <a:rPr lang="en-US" dirty="0"/>
-              <a:t>A </a:t>
-            </a:r>
-            <a:r>
-              <a:rPr lang="en-US" b="1" dirty="0"/>
-              <a:t>software engineer</a:t>
-            </a:r>
-            <a:r>
-              <a:rPr lang="en-US" dirty="0"/>
-              <a:t> to analyze source code, document logic, and execute technical tasks.</a:t>
-            </a:r>
-          </a:p>
-          <a:p>
-            <a:pPr marL="742950" lvl="1" indent="-285750">
-              <a:buFont typeface="Arial" panose="020B0604020202020204" pitchFamily="34" charset="0"/>
-              <a:buChar char="•"/>
-            </a:pPr>
-            <a:r>
-              <a:rPr lang="en-US" dirty="0"/>
-              <a:t>ADF/JSON File analysis</a:t>
-            </a:r>
-          </a:p>
-          <a:p>
-            <a:pPr marL="742950" lvl="1" indent="-285750">
-              <a:buFont typeface="Arial" panose="020B0604020202020204" pitchFamily="34" charset="0"/>
-              <a:buChar char="•"/>
-            </a:pPr>
-            <a:r>
-              <a:rPr lang="en-US" dirty="0"/>
-              <a:t>Snowflake/Stored-procedure analysis</a:t>
-            </a:r>
-          </a:p>
-          <a:p>
-            <a:endParaRPr lang="en-US" b="1" dirty="0"/>
-          </a:p>
-        </p:txBody>
-      </p:sp>
-      <p:cxnSp>
-        <p:nvCxnSpPr>
-          <p:cNvPr id="2" name="Straight Connector 1">
-            <a:extLst>
-              <a:ext uri="{FF2B5EF4-FFF2-40B4-BE49-F238E27FC236}">
-                <a16:creationId xmlns:a16="http://schemas.microsoft.com/office/drawing/2014/main" id="{22E1BF60-C091-F918-A508-C0CD2544E876}"/>
-              </a:ext>
-            </a:extLst>
-          </p:cNvPr>
-          <p:cNvCxnSpPr/>
-          <p:nvPr/>
-        </p:nvCxnSpPr>
-        <p:spPr>
-          <a:xfrm>
-            <a:off x="432619" y="545800"/>
-            <a:ext cx="11759381" cy="0"/>
-          </a:xfrm>
-          <a:prstGeom prst="line">
-            <a:avLst/>
-          </a:prstGeom>
-        </p:spPr>
-        <p:style>
-          <a:lnRef idx="3">
-            <a:schemeClr val="accent5"/>
-          </a:lnRef>
-          <a:fillRef idx="0">
-            <a:schemeClr val="accent5"/>
-          </a:fillRef>
-          <a:effectRef idx="2">
-            <a:schemeClr val="accent5"/>
-          </a:effectRef>
-          <a:fontRef idx="minor">
-            <a:schemeClr val="tx1"/>
-          </a:fontRef>
-        </p:style>
-      </p:cxnSp>
-      <p:sp>
-        <p:nvSpPr>
-          <p:cNvPr id="3" name="Rounded Rectangle 2">
-            <a:extLst>
-              <a:ext uri="{FF2B5EF4-FFF2-40B4-BE49-F238E27FC236}">
-                <a16:creationId xmlns:a16="http://schemas.microsoft.com/office/drawing/2014/main" id="{29183193-D05D-D1D0-1C3E-C757F541B166}"/>
-              </a:ext>
-            </a:extLst>
-          </p:cNvPr>
-          <p:cNvSpPr/>
-          <p:nvPr/>
-        </p:nvSpPr>
-        <p:spPr>
-          <a:xfrm>
-            <a:off x="5081666" y="861934"/>
-            <a:ext cx="2061147" cy="584617"/>
-          </a:xfrm>
-          <a:prstGeom prst="roundRect">
-            <a:avLst/>
-          </a:prstGeom>
-        </p:spPr>
-        <p:style>
-          <a:lnRef idx="2">
-            <a:schemeClr val="accent1">
-              <a:shade val="15000"/>
-            </a:schemeClr>
-          </a:lnRef>
-          <a:fillRef idx="1">
-            <a:schemeClr val="accent1"/>
-          </a:fillRef>
-          <a:effectRef idx="0">
-            <a:schemeClr val="accent1"/>
-          </a:effectRef>
-          <a:fontRef idx="minor">
-            <a:schemeClr val="lt1"/>
-          </a:fontRef>
-        </p:style>
-        <p:txBody>
-          <a:bodyPr rtlCol="0" anchor="ctr"/>
-          <a:lstStyle/>
-          <a:p>
-            <a:pPr algn="ctr"/>
-            <a:r>
-              <a:rPr lang="en-US" dirty="0"/>
-              <a:t>Auto Trader</a:t>
-            </a:r>
-          </a:p>
-        </p:txBody>
-      </p:sp>
-      <p:sp>
-        <p:nvSpPr>
-          <p:cNvPr id="5" name="Rounded Rectangle 4">
-            <a:extLst>
-              <a:ext uri="{FF2B5EF4-FFF2-40B4-BE49-F238E27FC236}">
-                <a16:creationId xmlns:a16="http://schemas.microsoft.com/office/drawing/2014/main" id="{AE830F09-2BA5-D787-AC4F-739E387459BC}"/>
-              </a:ext>
-            </a:extLst>
-          </p:cNvPr>
-          <p:cNvSpPr/>
-          <p:nvPr/>
-        </p:nvSpPr>
-        <p:spPr>
-          <a:xfrm>
-            <a:off x="432619" y="2151089"/>
-            <a:ext cx="2123204" cy="532150"/>
-          </a:xfrm>
-          <a:prstGeom prst="roundRect">
-            <a:avLst/>
-          </a:prstGeom>
-        </p:spPr>
-        <p:style>
-          <a:lnRef idx="2">
-            <a:schemeClr val="accent2">
-              <a:shade val="15000"/>
-            </a:schemeClr>
-          </a:lnRef>
-          <a:fillRef idx="1">
-            <a:schemeClr val="accent2"/>
-          </a:fillRef>
-          <a:effectRef idx="0">
-            <a:schemeClr val="accent2"/>
-          </a:effectRef>
-          <a:fontRef idx="minor">
-            <a:schemeClr val="lt1"/>
-          </a:fontRef>
-        </p:style>
-        <p:txBody>
-          <a:bodyPr rtlCol="0" anchor="ctr"/>
-          <a:lstStyle/>
-          <a:p>
-            <a:pPr algn="ctr"/>
-            <a:r>
-              <a:rPr lang="en-US" dirty="0"/>
-              <a:t>Sales Agent</a:t>
-            </a:r>
-          </a:p>
-        </p:txBody>
-      </p:sp>
-      <p:sp>
-        <p:nvSpPr>
-          <p:cNvPr id="7" name="Rounded Rectangle 6">
-            <a:extLst>
-              <a:ext uri="{FF2B5EF4-FFF2-40B4-BE49-F238E27FC236}">
-                <a16:creationId xmlns:a16="http://schemas.microsoft.com/office/drawing/2014/main" id="{B636C9CE-9EFC-E222-A5CA-D1507AA8F2BA}"/>
-              </a:ext>
-            </a:extLst>
-          </p:cNvPr>
-          <p:cNvSpPr/>
-          <p:nvPr/>
-        </p:nvSpPr>
-        <p:spPr>
-          <a:xfrm>
-            <a:off x="5051686" y="2151089"/>
-            <a:ext cx="2123204" cy="532150"/>
-          </a:xfrm>
-          <a:prstGeom prst="roundRect">
-            <a:avLst/>
-          </a:prstGeom>
-        </p:spPr>
-        <p:style>
-          <a:lnRef idx="2">
-            <a:schemeClr val="accent4">
-              <a:shade val="15000"/>
-            </a:schemeClr>
-          </a:lnRef>
-          <a:fillRef idx="1">
-            <a:schemeClr val="accent4"/>
-          </a:fillRef>
-          <a:effectRef idx="0">
-            <a:schemeClr val="accent4"/>
-          </a:effectRef>
-          <a:fontRef idx="minor">
-            <a:schemeClr val="lt1"/>
-          </a:fontRef>
-        </p:style>
-        <p:txBody>
-          <a:bodyPr rtlCol="0" anchor="ctr"/>
-          <a:lstStyle/>
-          <a:p>
-            <a:pPr algn="ctr"/>
-            <a:r>
-              <a:rPr lang="en-US" dirty="0"/>
-              <a:t>Financial Analyst</a:t>
-            </a:r>
-          </a:p>
-        </p:txBody>
-      </p:sp>
-      <p:sp>
-        <p:nvSpPr>
-          <p:cNvPr id="8" name="Rounded Rectangle 7">
-            <a:extLst>
-              <a:ext uri="{FF2B5EF4-FFF2-40B4-BE49-F238E27FC236}">
-                <a16:creationId xmlns:a16="http://schemas.microsoft.com/office/drawing/2014/main" id="{920EF24E-B36B-4F64-CC1D-2020959922C3}"/>
-              </a:ext>
-            </a:extLst>
-          </p:cNvPr>
-          <p:cNvSpPr/>
-          <p:nvPr/>
-        </p:nvSpPr>
-        <p:spPr>
-          <a:xfrm>
-            <a:off x="9941380" y="2151089"/>
-            <a:ext cx="2123204" cy="532150"/>
-          </a:xfrm>
-          <a:prstGeom prst="roundRect">
-            <a:avLst/>
-          </a:prstGeom>
-        </p:spPr>
-        <p:style>
-          <a:lnRef idx="2">
-            <a:schemeClr val="accent6">
-              <a:shade val="15000"/>
-            </a:schemeClr>
-          </a:lnRef>
-          <a:fillRef idx="1">
-            <a:schemeClr val="accent6"/>
-          </a:fillRef>
-          <a:effectRef idx="0">
-            <a:schemeClr val="accent6"/>
-          </a:effectRef>
-          <a:fontRef idx="minor">
-            <a:schemeClr val="lt1"/>
-          </a:fontRef>
-        </p:style>
-        <p:txBody>
-          <a:bodyPr rtlCol="0" anchor="ctr"/>
-          <a:lstStyle/>
-          <a:p>
-            <a:pPr algn="ctr"/>
-            <a:r>
-              <a:rPr lang="en-US" dirty="0"/>
-              <a:t>Engineer</a:t>
-            </a:r>
-          </a:p>
-        </p:txBody>
-      </p:sp>
-      <p:cxnSp>
-        <p:nvCxnSpPr>
-          <p:cNvPr id="10" name="Elbow Connector 9">
-            <a:extLst>
-              <a:ext uri="{FF2B5EF4-FFF2-40B4-BE49-F238E27FC236}">
-                <a16:creationId xmlns:a16="http://schemas.microsoft.com/office/drawing/2014/main" id="{6B3DA53C-6856-B923-0FC0-3F819C4BCCDB}"/>
-              </a:ext>
-            </a:extLst>
-          </p:cNvPr>
-          <p:cNvCxnSpPr>
-            <a:stCxn id="3" idx="2"/>
-            <a:endCxn id="5" idx="0"/>
-          </p:cNvCxnSpPr>
-          <p:nvPr/>
-        </p:nvCxnSpPr>
-        <p:spPr>
-          <a:xfrm rot="5400000">
-            <a:off x="3450962" y="-510189"/>
-            <a:ext cx="704538" cy="4618019"/>
-          </a:xfrm>
-          <a:prstGeom prst="bentConnector3">
-            <a:avLst/>
-          </a:prstGeom>
-          <a:ln>
-            <a:tailEnd type="triangle"/>
-          </a:ln>
-        </p:spPr>
-        <p:style>
-          <a:lnRef idx="1">
-            <a:schemeClr val="accent1"/>
-          </a:lnRef>
-          <a:fillRef idx="0">
-            <a:schemeClr val="accent1"/>
-          </a:fillRef>
-          <a:effectRef idx="0">
-            <a:schemeClr val="accent1"/>
-          </a:effectRef>
-          <a:fontRef idx="minor">
-            <a:schemeClr val="tx1"/>
-          </a:fontRef>
-        </p:style>
-      </p:cxnSp>
-      <p:cxnSp>
-        <p:nvCxnSpPr>
-          <p:cNvPr id="11" name="Elbow Connector 10">
-            <a:extLst>
-              <a:ext uri="{FF2B5EF4-FFF2-40B4-BE49-F238E27FC236}">
-                <a16:creationId xmlns:a16="http://schemas.microsoft.com/office/drawing/2014/main" id="{44BD70ED-2DC8-D8CC-20ED-FDDE8CE83543}"/>
-              </a:ext>
-            </a:extLst>
-          </p:cNvPr>
-          <p:cNvCxnSpPr>
-            <a:cxnSpLocks/>
-            <a:stCxn id="3" idx="2"/>
-            <a:endCxn id="7" idx="0"/>
-          </p:cNvCxnSpPr>
-          <p:nvPr/>
-        </p:nvCxnSpPr>
-        <p:spPr>
-          <a:xfrm rot="16200000" flipH="1">
-            <a:off x="5760495" y="1798296"/>
-            <a:ext cx="704538" cy="1048"/>
-          </a:xfrm>
-          <a:prstGeom prst="bentConnector3">
-            <a:avLst>
-              <a:gd name="adj1" fmla="val 50000"/>
-            </a:avLst>
-          </a:prstGeom>
-          <a:ln>
-            <a:tailEnd type="triangle"/>
-          </a:ln>
-        </p:spPr>
-        <p:style>
-          <a:lnRef idx="1">
-            <a:schemeClr val="accent1"/>
-          </a:lnRef>
-          <a:fillRef idx="0">
-            <a:schemeClr val="accent1"/>
-          </a:fillRef>
-          <a:effectRef idx="0">
-            <a:schemeClr val="accent1"/>
-          </a:effectRef>
-          <a:fontRef idx="minor">
-            <a:schemeClr val="tx1"/>
-          </a:fontRef>
-        </p:style>
-      </p:cxnSp>
-      <p:cxnSp>
-        <p:nvCxnSpPr>
-          <p:cNvPr id="14" name="Elbow Connector 13">
-            <a:extLst>
-              <a:ext uri="{FF2B5EF4-FFF2-40B4-BE49-F238E27FC236}">
-                <a16:creationId xmlns:a16="http://schemas.microsoft.com/office/drawing/2014/main" id="{7537D570-9B42-577D-3ECF-5036DC488D94}"/>
-              </a:ext>
-            </a:extLst>
-          </p:cNvPr>
-          <p:cNvCxnSpPr>
-            <a:cxnSpLocks/>
-            <a:stCxn id="3" idx="2"/>
-            <a:endCxn id="8" idx="0"/>
-          </p:cNvCxnSpPr>
-          <p:nvPr/>
-        </p:nvCxnSpPr>
-        <p:spPr>
-          <a:xfrm rot="16200000" flipH="1">
-            <a:off x="8205342" y="-646551"/>
-            <a:ext cx="704538" cy="4890742"/>
-          </a:xfrm>
-          <a:prstGeom prst="bentConnector3">
-            <a:avLst>
-              <a:gd name="adj1" fmla="val 50000"/>
-            </a:avLst>
-          </a:prstGeom>
-          <a:ln>
-            <a:tailEnd type="triangle"/>
-          </a:ln>
-        </p:spPr>
-        <p:style>
-          <a:lnRef idx="1">
-            <a:schemeClr val="accent1"/>
-          </a:lnRef>
-          <a:fillRef idx="0">
-            <a:schemeClr val="accent1"/>
-          </a:fillRef>
-          <a:effectRef idx="0">
-            <a:schemeClr val="accent1"/>
-          </a:effectRef>
-          <a:fontRef idx="minor">
-            <a:schemeClr val="tx1"/>
-          </a:fontRef>
-        </p:style>
-      </p:cxnSp>
-      <p:sp>
-        <p:nvSpPr>
-          <p:cNvPr id="18" name="TextBox 17">
-            <a:extLst>
-              <a:ext uri="{FF2B5EF4-FFF2-40B4-BE49-F238E27FC236}">
-                <a16:creationId xmlns:a16="http://schemas.microsoft.com/office/drawing/2014/main" id="{E244444A-9D00-1A66-2EFE-3292C1E5A4F3}"/>
-              </a:ext>
-            </a:extLst>
-          </p:cNvPr>
-          <p:cNvSpPr txBox="1"/>
-          <p:nvPr/>
-        </p:nvSpPr>
-        <p:spPr>
-          <a:xfrm>
-            <a:off x="299655" y="3050659"/>
-            <a:ext cx="2782771" cy="3139321"/>
-          </a:xfrm>
-          <a:prstGeom prst="rect">
-            <a:avLst/>
-          </a:prstGeom>
-          <a:noFill/>
-        </p:spPr>
-        <p:txBody>
-          <a:bodyPr wrap="square">
-            <a:spAutoFit/>
-          </a:bodyPr>
-          <a:lstStyle/>
-          <a:p>
-            <a:pPr marL="285750" indent="-285750">
-              <a:buFont typeface="Arial" panose="020B0604020202020204" pitchFamily="34" charset="0"/>
-              <a:buChar char="•"/>
-            </a:pPr>
-            <a:r>
-              <a:rPr lang="en-US" dirty="0"/>
-              <a:t>A </a:t>
-            </a:r>
-            <a:r>
-              <a:rPr lang="en-US" b="1" dirty="0"/>
-              <a:t>sales representative</a:t>
-            </a:r>
-            <a:r>
-              <a:rPr lang="en-US" dirty="0"/>
-              <a:t> to engage with customers and provide details about available inventory.</a:t>
-            </a:r>
-          </a:p>
-          <a:p>
-            <a:pPr marL="285750" indent="-285750">
-              <a:buFont typeface="Arial" panose="020B0604020202020204" pitchFamily="34" charset="0"/>
-              <a:buChar char="•"/>
-            </a:pPr>
-            <a:endParaRPr lang="en-US" dirty="0"/>
-          </a:p>
-          <a:p>
-            <a:pPr marL="285750" indent="-285750">
-              <a:buFont typeface="Arial" panose="020B0604020202020204" pitchFamily="34" charset="0"/>
-              <a:buChar char="•"/>
-            </a:pPr>
-            <a:r>
-              <a:rPr lang="en-US" dirty="0"/>
-              <a:t>An </a:t>
-            </a:r>
-            <a:r>
-              <a:rPr lang="en-US" b="1" dirty="0"/>
-              <a:t>agent</a:t>
-            </a:r>
-            <a:r>
-              <a:rPr lang="en-US" dirty="0"/>
-              <a:t> that can retrieve additional insights beyond inventory through </a:t>
-            </a:r>
-            <a:r>
-              <a:rPr lang="en-US" b="1" dirty="0"/>
-              <a:t>web searches</a:t>
-            </a:r>
-            <a:r>
-              <a:rPr lang="en-US" dirty="0"/>
-              <a:t>.</a:t>
-            </a:r>
-          </a:p>
-        </p:txBody>
-      </p:sp>
-      <p:sp>
-        <p:nvSpPr>
-          <p:cNvPr id="20" name="TextBox 19">
-            <a:extLst>
-              <a:ext uri="{FF2B5EF4-FFF2-40B4-BE49-F238E27FC236}">
-                <a16:creationId xmlns:a16="http://schemas.microsoft.com/office/drawing/2014/main" id="{388C5C6E-8D7D-BA76-8CEC-F0A42EFBD4A1}"/>
-              </a:ext>
-            </a:extLst>
-          </p:cNvPr>
-          <p:cNvSpPr txBox="1"/>
-          <p:nvPr/>
-        </p:nvSpPr>
-        <p:spPr>
-          <a:xfrm>
-            <a:off x="4853065" y="3073305"/>
-            <a:ext cx="2926830" cy="2585323"/>
-          </a:xfrm>
-          <a:prstGeom prst="rect">
-            <a:avLst/>
-          </a:prstGeom>
-          <a:noFill/>
-        </p:spPr>
-        <p:txBody>
-          <a:bodyPr wrap="square">
-            <a:spAutoFit/>
-          </a:bodyPr>
-          <a:lstStyle/>
-          <a:p>
-            <a:pPr marL="285750" indent="-285750">
-              <a:buFont typeface="Arial" panose="020B0604020202020204" pitchFamily="34" charset="0"/>
-              <a:buChar char="•"/>
-            </a:pPr>
-            <a:r>
-              <a:rPr lang="en-US" dirty="0"/>
-              <a:t>A </a:t>
-            </a:r>
-            <a:r>
-              <a:rPr lang="en-US" b="1" dirty="0"/>
-              <a:t>financial analyst</a:t>
-            </a:r>
-            <a:r>
-              <a:rPr lang="en-US" dirty="0"/>
-              <a:t> to evaluate multi-year sales data and generate sales forecasts.</a:t>
-            </a:r>
-          </a:p>
-          <a:p>
-            <a:pPr marL="285750" indent="-285750">
-              <a:buFont typeface="Arial" panose="020B0604020202020204" pitchFamily="34" charset="0"/>
-              <a:buChar char="•"/>
-            </a:pPr>
-            <a:endParaRPr lang="en-US" dirty="0"/>
-          </a:p>
-          <a:p>
-            <a:pPr marL="285750" indent="-285750">
-              <a:buFont typeface="Arial" panose="020B0604020202020204" pitchFamily="34" charset="0"/>
-              <a:buChar char="•"/>
-            </a:pPr>
-            <a:r>
-              <a:rPr lang="en-US" dirty="0"/>
-              <a:t>An </a:t>
-            </a:r>
-            <a:r>
-              <a:rPr lang="en-US" b="1" dirty="0"/>
-              <a:t>executive assistant</a:t>
-            </a:r>
-            <a:r>
-              <a:rPr lang="en-US" dirty="0"/>
-              <a:t> responsible for managing communications, including sending emails.</a:t>
-            </a:r>
-          </a:p>
-        </p:txBody>
-      </p:sp>
-    </p:spTree>
-    <p:extLst>
-      <p:ext uri="{BB962C8B-B14F-4D97-AF65-F5344CB8AC3E}">
-        <p14:creationId xmlns:p14="http://schemas.microsoft.com/office/powerpoint/2010/main" val="3676540794"/>
-      </p:ext>
-    </p:extLst>
-  </p:cSld>
-  <p:clrMapOvr>
-    <a:masterClrMapping/>
-  </p:clrMapOvr>
-</p:sld>
-</file>
-
-<file path=ppt/slides/slide6.xml><?xml version="1.0" encoding="utf-8"?>
-<p:sld xmlns:a="http://schemas.openxmlformats.org/drawingml/2006/main" xmlns:r="http://schemas.openxmlformats.org/officeDocument/2006/relationships" xmlns:p="http://schemas.openxmlformats.org/presentationml/2006/main">
-  <p:cSld>
-    <p:spTree>
-      <p:nvGrpSpPr>
-        <p:cNvPr id="1" name=""/>
-        <p:cNvGrpSpPr/>
-        <p:nvPr/>
-      </p:nvGrpSpPr>
-      <p:grpSpPr>
-        <a:xfrm>
-          <a:off x="0" y="0"/>
-          <a:ext cx="0" cy="0"/>
-          <a:chOff x="0" y="0"/>
-          <a:chExt cx="0" cy="0"/>
-        </a:xfrm>
-      </p:grpSpPr>
-      <p:sp>
-        <p:nvSpPr>
-          <p:cNvPr id="4" name="TextBox 3">
-            <a:extLst>
-              <a:ext uri="{FF2B5EF4-FFF2-40B4-BE49-F238E27FC236}">
-                <a16:creationId xmlns:a16="http://schemas.microsoft.com/office/drawing/2014/main" id="{0B205ED7-CA2A-2FFE-8AF6-7C1545C8E1FC}"/>
-              </a:ext>
-            </a:extLst>
-          </p:cNvPr>
-          <p:cNvSpPr txBox="1"/>
-          <p:nvPr/>
-        </p:nvSpPr>
-        <p:spPr>
-          <a:xfrm>
-            <a:off x="378314" y="2719180"/>
-            <a:ext cx="838691" cy="461665"/>
-          </a:xfrm>
-          <a:prstGeom prst="rect">
-            <a:avLst/>
-          </a:prstGeom>
-          <a:noFill/>
-        </p:spPr>
-        <p:txBody>
-          <a:bodyPr wrap="none" rtlCol="0">
-            <a:spAutoFit/>
-          </a:bodyPr>
-          <a:lstStyle/>
-          <a:p>
-            <a:r>
-              <a:rPr lang="en-US" sz="2400" dirty="0"/>
-              <a:t>COST</a:t>
+              <a:t>How does it all work?</a:t>
             </a:r>
           </a:p>
         </p:txBody>
@@ -7449,6 +7694,107 @@
 </p:sld>
 </file>
 
+<file path=ppt/slides/slide6.xml><?xml version="1.0" encoding="utf-8"?>
+<p:sld xmlns:a="http://schemas.openxmlformats.org/drawingml/2006/main" xmlns:r="http://schemas.openxmlformats.org/officeDocument/2006/relationships" xmlns:p="http://schemas.openxmlformats.org/presentationml/2006/main">
+  <p:cSld>
+    <p:spTree>
+      <p:nvGrpSpPr>
+        <p:cNvPr id="1" name=""/>
+        <p:cNvGrpSpPr/>
+        <p:nvPr/>
+      </p:nvGrpSpPr>
+      <p:grpSpPr>
+        <a:xfrm>
+          <a:off x="0" y="0"/>
+          <a:ext cx="0" cy="0"/>
+          <a:chOff x="0" y="0"/>
+          <a:chExt cx="0" cy="0"/>
+        </a:xfrm>
+      </p:grpSpPr>
+      <p:sp>
+        <p:nvSpPr>
+          <p:cNvPr id="4" name="TextBox 3">
+            <a:extLst>
+              <a:ext uri="{FF2B5EF4-FFF2-40B4-BE49-F238E27FC236}">
+                <a16:creationId xmlns:a16="http://schemas.microsoft.com/office/drawing/2014/main" id="{0B205ED7-CA2A-2FFE-8AF6-7C1545C8E1FC}"/>
+              </a:ext>
+            </a:extLst>
+          </p:cNvPr>
+          <p:cNvSpPr txBox="1"/>
+          <p:nvPr/>
+        </p:nvSpPr>
+        <p:spPr>
+          <a:xfrm>
+            <a:off x="378314" y="2719180"/>
+            <a:ext cx="2860783" cy="461665"/>
+          </a:xfrm>
+          <a:prstGeom prst="rect">
+            <a:avLst/>
+          </a:prstGeom>
+          <a:noFill/>
+        </p:spPr>
+        <p:txBody>
+          <a:bodyPr wrap="none" rtlCol="0">
+            <a:spAutoFit/>
+          </a:bodyPr>
+          <a:lstStyle/>
+          <a:p>
+            <a:r>
+              <a:rPr lang="en-US" sz="2400" dirty="0"/>
+              <a:t>How does it all work?</a:t>
+            </a:r>
+          </a:p>
+        </p:txBody>
+      </p:sp>
+      <p:cxnSp>
+        <p:nvCxnSpPr>
+          <p:cNvPr id="2" name="Straight Connector 1">
+            <a:extLst>
+              <a:ext uri="{FF2B5EF4-FFF2-40B4-BE49-F238E27FC236}">
+                <a16:creationId xmlns:a16="http://schemas.microsoft.com/office/drawing/2014/main" id="{89154393-A6FF-CF4B-8A1D-57D7E90FAC33}"/>
+              </a:ext>
+            </a:extLst>
+          </p:cNvPr>
+          <p:cNvCxnSpPr/>
+          <p:nvPr/>
+        </p:nvCxnSpPr>
+        <p:spPr>
+          <a:xfrm>
+            <a:off x="432619" y="3156155"/>
+            <a:ext cx="11759381" cy="0"/>
+          </a:xfrm>
+          <a:prstGeom prst="line">
+            <a:avLst/>
+          </a:prstGeom>
+        </p:spPr>
+        <p:style>
+          <a:lnRef idx="3">
+            <a:schemeClr val="accent5"/>
+          </a:lnRef>
+          <a:fillRef idx="0">
+            <a:schemeClr val="accent5"/>
+          </a:fillRef>
+          <a:effectRef idx="2">
+            <a:schemeClr val="accent5"/>
+          </a:effectRef>
+          <a:fontRef idx="minor">
+            <a:schemeClr val="tx1"/>
+          </a:fontRef>
+        </p:style>
+      </p:cxnSp>
+    </p:spTree>
+    <p:extLst>
+      <p:ext uri="{BB962C8B-B14F-4D97-AF65-F5344CB8AC3E}">
+        <p14:creationId xmlns:p14="http://schemas.microsoft.com/office/powerpoint/2010/main" val="1633760108"/>
+      </p:ext>
+    </p:extLst>
+  </p:cSld>
+  <p:clrMapOvr>
+    <a:masterClrMapping/>
+  </p:clrMapOvr>
+</p:sld>
+</file>
+
 <file path=ppt/slides/slide7.xml><?xml version="1.0" encoding="utf-8"?>
 <p:sld xmlns:a="http://schemas.openxmlformats.org/drawingml/2006/main" xmlns:r="http://schemas.openxmlformats.org/officeDocument/2006/relationships" xmlns:p="http://schemas.openxmlformats.org/presentationml/2006/main">
   <p:cSld>
@@ -7471,7 +7817,7 @@
           <p:cNvPr id="3" name="TextBox 2">
             <a:extLst>
               <a:ext uri="{FF2B5EF4-FFF2-40B4-BE49-F238E27FC236}">
-                <a16:creationId xmlns:a16="http://schemas.microsoft.com/office/drawing/2014/main" id="{61F52439-6AF5-5D38-D5D2-5AB934AE383A}"/>
+                <a16:creationId xmlns:a16="http://schemas.microsoft.com/office/drawing/2014/main" id="{1C043895-FF95-D826-59CE-DBB5ADF31B12}"/>
               </a:ext>
             </a:extLst>
           </p:cNvPr>
@@ -7481,7 +7827,7 @@
         <p:spPr>
           <a:xfrm>
             <a:off x="299655" y="74303"/>
-            <a:ext cx="729430" cy="461665"/>
+            <a:ext cx="5504905" cy="461665"/>
           </a:xfrm>
           <a:prstGeom prst="rect">
             <a:avLst/>
@@ -7496,7 +7842,7 @@
           <a:p>
             <a:r>
               <a:rPr lang="en-US" sz="2400" dirty="0"/>
-              <a:t>Cost</a:t>
+              <a:t>Agentic AI Setup – A Hypothetical Scenario</a:t>
             </a:r>
           </a:p>
         </p:txBody>
@@ -7506,7 +7852,7 @@
           <p:cNvPr id="5" name="Straight Connector 4">
             <a:extLst>
               <a:ext uri="{FF2B5EF4-FFF2-40B4-BE49-F238E27FC236}">
-                <a16:creationId xmlns:a16="http://schemas.microsoft.com/office/drawing/2014/main" id="{E9EF8585-FC8F-D680-0FDC-8831BAB64670}"/>
+                <a16:creationId xmlns:a16="http://schemas.microsoft.com/office/drawing/2014/main" id="{FAEB4772-560A-9710-8926-CF7774888F9F}"/>
               </a:ext>
             </a:extLst>
           </p:cNvPr>
@@ -7539,10 +7885,10 @@
       </p:cxnSp>
       <p:sp>
         <p:nvSpPr>
-          <p:cNvPr id="8" name="Rectangle 7">
-            <a:extLst>
-              <a:ext uri="{FF2B5EF4-FFF2-40B4-BE49-F238E27FC236}">
-                <a16:creationId xmlns:a16="http://schemas.microsoft.com/office/drawing/2014/main" id="{B050F634-6B01-D651-D1B1-F2FADA24BA4C}"/>
+          <p:cNvPr id="6" name="Rounded Rectangle 5">
+            <a:extLst>
+              <a:ext uri="{FF2B5EF4-FFF2-40B4-BE49-F238E27FC236}">
+                <a16:creationId xmlns:a16="http://schemas.microsoft.com/office/drawing/2014/main" id="{3D6456C6-D6CA-1A3F-3A71-4B52DA95AF7B}"/>
               </a:ext>
             </a:extLst>
           </p:cNvPr>
@@ -7551,23 +7897,18 @@
         </p:nvSpPr>
         <p:spPr>
           <a:xfrm>
-            <a:off x="178943" y="1885010"/>
-            <a:ext cx="1753444" cy="806246"/>
-          </a:xfrm>
-          <a:prstGeom prst="rect">
-            <a:avLst/>
-          </a:prstGeom>
-          <a:solidFill>
-            <a:srgbClr val="002060"/>
-          </a:solidFill>
-          <a:effectLst>
-            <a:glow rad="101600">
-              <a:schemeClr val="accent2">
-                <a:satMod val="175000"/>
-                <a:alpha val="40000"/>
-              </a:schemeClr>
-            </a:glow>
-          </a:effectLst>
+            <a:off x="627320" y="1722474"/>
+            <a:ext cx="4518837" cy="4465671"/>
+          </a:xfrm>
+          <a:prstGeom prst="roundRect">
+            <a:avLst>
+              <a:gd name="adj" fmla="val 4151"/>
+            </a:avLst>
+          </a:prstGeom>
+          <a:noFill/>
+          <a:ln>
+            <a:prstDash val="dash"/>
+          </a:ln>
         </p:spPr>
         <p:style>
           <a:lnRef idx="2">
@@ -7590,26 +7931,63 @@
           <a:lstStyle/>
           <a:p>
             <a:pPr algn="ctr"/>
-            <a:r>
-              <a:rPr lang="en-US" sz="2000" dirty="0"/>
-              <a:t>Total Tokens </a:t>
-            </a:r>
-          </a:p>
-          <a:p>
-            <a:pPr algn="ctr"/>
-            <a:r>
-              <a:rPr lang="en-US" sz="2000" dirty="0"/>
-              <a:t>2,562,236</a:t>
-            </a:r>
-          </a:p>
-        </p:txBody>
-      </p:sp>
+            <a:endParaRPr lang="en-US"/>
+          </a:p>
+        </p:txBody>
+      </p:sp>
+      <p:pic>
+        <p:nvPicPr>
+          <p:cNvPr id="1026" name="Picture 2" descr="Python icon - Free download on Iconfinder">
+            <a:extLst>
+              <a:ext uri="{FF2B5EF4-FFF2-40B4-BE49-F238E27FC236}">
+                <a16:creationId xmlns:a16="http://schemas.microsoft.com/office/drawing/2014/main" id="{BAFF3243-5659-47AE-36B5-6C17332F6A1F}"/>
+              </a:ext>
+            </a:extLst>
+          </p:cNvPr>
+          <p:cNvPicPr>
+            <a:picLocks noChangeAspect="1" noChangeArrowheads="1"/>
+          </p:cNvPicPr>
+          <p:nvPr/>
+        </p:nvPicPr>
+        <p:blipFill>
+          <a:blip r:embed="rId2">
+            <a:extLst>
+              <a:ext uri="{28A0092B-C50C-407E-A947-70E740481C1C}">
+                <a14:useLocalDpi xmlns:a14="http://schemas.microsoft.com/office/drawing/2010/main" val="0"/>
+              </a:ext>
+            </a:extLst>
+          </a:blip>
+          <a:srcRect/>
+          <a:stretch>
+            <a:fillRect/>
+          </a:stretch>
+        </p:blipFill>
+        <p:spPr bwMode="auto">
+          <a:xfrm>
+            <a:off x="4806157" y="1549052"/>
+            <a:ext cx="493400" cy="493400"/>
+          </a:xfrm>
+          <a:prstGeom prst="rect">
+            <a:avLst/>
+          </a:prstGeom>
+          <a:noFill/>
+          <a:extLst>
+            <a:ext uri="{909E8E84-426E-40DD-AFC4-6F175D3DCCD1}">
+              <a14:hiddenFill xmlns:a14="http://schemas.microsoft.com/office/drawing/2010/main">
+                <a:solidFill>
+                  <a:srgbClr val="FFFFFF"/>
+                </a:solidFill>
+              </a14:hiddenFill>
+            </a:ext>
+          </a:extLst>
+        </p:spPr>
+      </p:pic>
       <p:sp>
         <p:nvSpPr>
           <p:cNvPr id="9" name="Rectangle 8">
             <a:extLst>
               <a:ext uri="{FF2B5EF4-FFF2-40B4-BE49-F238E27FC236}">
-                <a16:creationId xmlns:a16="http://schemas.microsoft.com/office/drawing/2014/main" id="{B20A5704-18BF-DBC0-3A0B-B8EA205E7D2F}"/>
+                <a16:creationId xmlns:a16="http://schemas.microsoft.com/office/drawing/2014/main" id="{181CA5E8-E59B-0752-D8DB-E70E50EB4B11}"/>
               </a:ext>
             </a:extLst>
           </p:cNvPr>
@@ -7618,23 +7996,17 @@
         </p:nvSpPr>
         <p:spPr>
           <a:xfrm>
-            <a:off x="178943" y="3181170"/>
-            <a:ext cx="1753444" cy="806246"/>
+            <a:off x="817111" y="2015232"/>
+            <a:ext cx="2202536" cy="296387"/>
           </a:xfrm>
           <a:prstGeom prst="rect">
             <a:avLst/>
           </a:prstGeom>
           <a:solidFill>
-            <a:srgbClr val="002060"/>
+            <a:schemeClr val="bg2">
+              <a:lumMod val="90000"/>
+            </a:schemeClr>
           </a:solidFill>
-          <a:effectLst>
-            <a:glow rad="101600">
-              <a:schemeClr val="accent2">
-                <a:satMod val="175000"/>
-                <a:alpha val="40000"/>
-              </a:schemeClr>
-            </a:glow>
-          </a:effectLst>
         </p:spPr>
         <p:style>
           <a:lnRef idx="2">
@@ -7658,25 +8030,122 @@
           <a:p>
             <a:pPr algn="ctr"/>
             <a:r>
-              <a:rPr lang="en-US" sz="2000" dirty="0"/>
-              <a:t>Total Requests </a:t>
-            </a:r>
-          </a:p>
-          <a:p>
-            <a:pPr algn="ctr"/>
-            <a:r>
-              <a:rPr lang="en-US" sz="2000" dirty="0"/>
-              <a:t>777</a:t>
-            </a:r>
-          </a:p>
-        </p:txBody>
-      </p:sp>
-      <p:sp>
-        <p:nvSpPr>
-          <p:cNvPr id="10" name="Rectangle 9">
-            <a:extLst>
-              <a:ext uri="{FF2B5EF4-FFF2-40B4-BE49-F238E27FC236}">
-                <a16:creationId xmlns:a16="http://schemas.microsoft.com/office/drawing/2014/main" id="{DC5CB9B1-154A-7E14-1F77-4FEAD148634D}"/>
+              <a:rPr lang="en-US" sz="1000" dirty="0" err="1">
+                <a:solidFill>
+                  <a:schemeClr val="tx1"/>
+                </a:solidFill>
+              </a:rPr>
+              <a:t>OpenAI</a:t>
+            </a:r>
+            <a:r>
+              <a:rPr lang="en-US" sz="1000" dirty="0">
+                <a:solidFill>
+                  <a:schemeClr val="tx1"/>
+                </a:solidFill>
+              </a:rPr>
+              <a:t> Agent SDK</a:t>
+            </a:r>
+          </a:p>
+        </p:txBody>
+      </p:sp>
+      <p:sp>
+        <p:nvSpPr>
+          <p:cNvPr id="12" name="TextBox 11">
+            <a:extLst>
+              <a:ext uri="{FF2B5EF4-FFF2-40B4-BE49-F238E27FC236}">
+                <a16:creationId xmlns:a16="http://schemas.microsoft.com/office/drawing/2014/main" id="{ED8B41B5-06B6-DB7A-3468-8C909EC922D1}"/>
+              </a:ext>
+            </a:extLst>
+          </p:cNvPr>
+          <p:cNvSpPr txBox="1"/>
+          <p:nvPr/>
+        </p:nvSpPr>
+        <p:spPr>
+          <a:xfrm>
+            <a:off x="868266" y="1588556"/>
+            <a:ext cx="1676293" cy="215444"/>
+          </a:xfrm>
+          <a:prstGeom prst="rect">
+            <a:avLst/>
+          </a:prstGeom>
+          <a:solidFill>
+            <a:schemeClr val="bg1"/>
+          </a:solidFill>
+        </p:spPr>
+        <p:txBody>
+          <a:bodyPr wrap="none" lIns="0" tIns="0" rIns="0" bIns="0" rtlCol="0">
+            <a:spAutoFit/>
+          </a:bodyPr>
+          <a:lstStyle/>
+          <a:p>
+            <a:r>
+              <a:rPr lang="en-US" sz="1400" dirty="0"/>
+              <a:t> </a:t>
+            </a:r>
+            <a:r>
+              <a:rPr lang="en-US" sz="1400" dirty="0" err="1"/>
+              <a:t>AgenticAi</a:t>
+            </a:r>
+            <a:r>
+              <a:rPr lang="en-US" sz="1400" dirty="0"/>
+              <a:t> Auto Trader </a:t>
+            </a:r>
+          </a:p>
+        </p:txBody>
+      </p:sp>
+      <p:pic>
+        <p:nvPicPr>
+          <p:cNvPr id="13" name="Picture 4" descr="openai&quot; Icon - Download for free – Iconduck">
+            <a:extLst>
+              <a:ext uri="{FF2B5EF4-FFF2-40B4-BE49-F238E27FC236}">
+                <a16:creationId xmlns:a16="http://schemas.microsoft.com/office/drawing/2014/main" id="{5F8B2439-82B8-B981-D858-6656A51915F0}"/>
+              </a:ext>
+            </a:extLst>
+          </p:cNvPr>
+          <p:cNvPicPr>
+            <a:picLocks noChangeAspect="1" noChangeArrowheads="1"/>
+          </p:cNvPicPr>
+          <p:nvPr/>
+        </p:nvPicPr>
+        <p:blipFill>
+          <a:blip r:embed="rId3">
+            <a:extLst>
+              <a:ext uri="{28A0092B-C50C-407E-A947-70E740481C1C}">
+                <a14:useLocalDpi xmlns:a14="http://schemas.microsoft.com/office/drawing/2010/main" val="0"/>
+              </a:ext>
+            </a:extLst>
+          </a:blip>
+          <a:srcRect/>
+          <a:stretch>
+            <a:fillRect/>
+          </a:stretch>
+        </p:blipFill>
+        <p:spPr bwMode="auto">
+          <a:xfrm>
+            <a:off x="1140390" y="2079039"/>
+            <a:ext cx="198821" cy="201495"/>
+          </a:xfrm>
+          <a:prstGeom prst="rect">
+            <a:avLst/>
+          </a:prstGeom>
+          <a:noFill/>
+          <a:extLst>
+            <a:ext uri="{909E8E84-426E-40DD-AFC4-6F175D3DCCD1}">
+              <a14:hiddenFill xmlns:a14="http://schemas.microsoft.com/office/drawing/2010/main">
+                <a:solidFill>
+                  <a:srgbClr val="FFFFFF"/>
+                </a:solidFill>
+              </a14:hiddenFill>
+            </a:ext>
+          </a:extLst>
+        </p:spPr>
+      </p:pic>
+      <p:sp>
+        <p:nvSpPr>
+          <p:cNvPr id="14" name="Rectangle 13">
+            <a:extLst>
+              <a:ext uri="{FF2B5EF4-FFF2-40B4-BE49-F238E27FC236}">
+                <a16:creationId xmlns:a16="http://schemas.microsoft.com/office/drawing/2014/main" id="{B45E53AA-8D35-E00C-78E1-0A9074E13217}"/>
               </a:ext>
             </a:extLst>
           </p:cNvPr>
@@ -7685,23 +8154,12 @@
         </p:nvSpPr>
         <p:spPr>
           <a:xfrm>
-            <a:off x="178943" y="4382729"/>
-            <a:ext cx="1753444" cy="806246"/>
+            <a:off x="868266" y="2418951"/>
+            <a:ext cx="216255" cy="3503383"/>
           </a:xfrm>
           <a:prstGeom prst="rect">
             <a:avLst/>
           </a:prstGeom>
-          <a:solidFill>
-            <a:srgbClr val="002060"/>
-          </a:solidFill>
-          <a:effectLst>
-            <a:glow rad="101600">
-              <a:schemeClr val="accent2">
-                <a:satMod val="175000"/>
-                <a:alpha val="40000"/>
-              </a:schemeClr>
-            </a:glow>
-          </a:effectLst>
         </p:spPr>
         <p:style>
           <a:lnRef idx="2">
@@ -7720,66 +8178,855 @@
           </a:fontRef>
         </p:style>
         <p:txBody>
-          <a:bodyPr rtlCol="0" anchor="ctr"/>
+          <a:bodyPr vert="vert270" rtlCol="0" anchor="ctr"/>
           <a:lstStyle/>
           <a:p>
             <a:pPr algn="ctr"/>
             <a:r>
-              <a:rPr lang="en-US" sz="2000" dirty="0"/>
-              <a:t>Total Spent </a:t>
-            </a:r>
-          </a:p>
+              <a:rPr lang="en-US" sz="1100" dirty="0"/>
+              <a:t>Agent Orchestrator</a:t>
+            </a:r>
+          </a:p>
+        </p:txBody>
+      </p:sp>
+      <p:sp>
+        <p:nvSpPr>
+          <p:cNvPr id="15" name="Rectangle 14">
+            <a:extLst>
+              <a:ext uri="{FF2B5EF4-FFF2-40B4-BE49-F238E27FC236}">
+                <a16:creationId xmlns:a16="http://schemas.microsoft.com/office/drawing/2014/main" id="{E26BDEE5-17D2-D4FA-7F21-D4FE1C75427E}"/>
+              </a:ext>
+            </a:extLst>
+          </p:cNvPr>
+          <p:cNvSpPr/>
+          <p:nvPr/>
+        </p:nvSpPr>
+        <p:spPr>
+          <a:xfrm>
+            <a:off x="1364739" y="2675366"/>
+            <a:ext cx="1508424" cy="238339"/>
+          </a:xfrm>
+          <a:prstGeom prst="rect">
+            <a:avLst/>
+          </a:prstGeom>
+        </p:spPr>
+        <p:style>
+          <a:lnRef idx="2">
+            <a:schemeClr val="accent1">
+              <a:shade val="15000"/>
+            </a:schemeClr>
+          </a:lnRef>
+          <a:fillRef idx="1">
+            <a:schemeClr val="accent1"/>
+          </a:fillRef>
+          <a:effectRef idx="0">
+            <a:schemeClr val="accent1"/>
+          </a:effectRef>
+          <a:fontRef idx="minor">
+            <a:schemeClr val="lt1"/>
+          </a:fontRef>
+        </p:style>
+        <p:txBody>
+          <a:bodyPr vert="horz" rtlCol="0" anchor="ctr"/>
+          <a:lstStyle/>
           <a:p>
             <a:pPr algn="ctr"/>
             <a:r>
-              <a:rPr lang="en-US" sz="2800" dirty="0"/>
-              <a:t>$5.28</a:t>
+              <a:rPr lang="en-US" sz="1100" dirty="0"/>
+              <a:t>Sales Agent</a:t>
+            </a:r>
+          </a:p>
+        </p:txBody>
+      </p:sp>
+      <p:sp>
+        <p:nvSpPr>
+          <p:cNvPr id="16" name="Rectangle 15">
+            <a:extLst>
+              <a:ext uri="{FF2B5EF4-FFF2-40B4-BE49-F238E27FC236}">
+                <a16:creationId xmlns:a16="http://schemas.microsoft.com/office/drawing/2014/main" id="{128C9241-BAA6-DB91-EC1E-58592A012132}"/>
+              </a:ext>
+            </a:extLst>
+          </p:cNvPr>
+          <p:cNvSpPr/>
+          <p:nvPr/>
+        </p:nvSpPr>
+        <p:spPr>
+          <a:xfrm>
+            <a:off x="1397089" y="3551289"/>
+            <a:ext cx="1508424" cy="238339"/>
+          </a:xfrm>
+          <a:prstGeom prst="rect">
+            <a:avLst/>
+          </a:prstGeom>
+        </p:spPr>
+        <p:style>
+          <a:lnRef idx="2">
+            <a:schemeClr val="accent1">
+              <a:shade val="15000"/>
+            </a:schemeClr>
+          </a:lnRef>
+          <a:fillRef idx="1">
+            <a:schemeClr val="accent1"/>
+          </a:fillRef>
+          <a:effectRef idx="0">
+            <a:schemeClr val="accent1"/>
+          </a:effectRef>
+          <a:fontRef idx="minor">
+            <a:schemeClr val="lt1"/>
+          </a:fontRef>
+        </p:style>
+        <p:txBody>
+          <a:bodyPr vert="horz" rtlCol="0" anchor="ctr"/>
+          <a:lstStyle/>
+          <a:p>
+            <a:pPr algn="ctr"/>
+            <a:r>
+              <a:rPr lang="en-US" sz="1100" dirty="0"/>
+              <a:t>External Agent</a:t>
+            </a:r>
+          </a:p>
+        </p:txBody>
+      </p:sp>
+      <p:sp>
+        <p:nvSpPr>
+          <p:cNvPr id="17" name="Rectangle 16">
+            <a:extLst>
+              <a:ext uri="{FF2B5EF4-FFF2-40B4-BE49-F238E27FC236}">
+                <a16:creationId xmlns:a16="http://schemas.microsoft.com/office/drawing/2014/main" id="{94952E1C-ACD8-CB5F-A79E-3FEEA7489AAC}"/>
+              </a:ext>
+            </a:extLst>
+          </p:cNvPr>
+          <p:cNvSpPr/>
+          <p:nvPr/>
+        </p:nvSpPr>
+        <p:spPr>
+          <a:xfrm>
+            <a:off x="1378314" y="4450808"/>
+            <a:ext cx="1508424" cy="238339"/>
+          </a:xfrm>
+          <a:prstGeom prst="rect">
+            <a:avLst/>
+          </a:prstGeom>
+        </p:spPr>
+        <p:style>
+          <a:lnRef idx="2">
+            <a:schemeClr val="accent1">
+              <a:shade val="15000"/>
+            </a:schemeClr>
+          </a:lnRef>
+          <a:fillRef idx="1">
+            <a:schemeClr val="accent1"/>
+          </a:fillRef>
+          <a:effectRef idx="0">
+            <a:schemeClr val="accent1"/>
+          </a:effectRef>
+          <a:fontRef idx="minor">
+            <a:schemeClr val="lt1"/>
+          </a:fontRef>
+        </p:style>
+        <p:txBody>
+          <a:bodyPr vert="horz" rtlCol="0" anchor="ctr"/>
+          <a:lstStyle/>
+          <a:p>
+            <a:pPr algn="ctr"/>
+            <a:r>
+              <a:rPr lang="en-US" sz="1100" dirty="0"/>
+              <a:t>Financial Analyst Agent</a:t>
+            </a:r>
+          </a:p>
+        </p:txBody>
+      </p:sp>
+      <p:sp>
+        <p:nvSpPr>
+          <p:cNvPr id="18" name="Rectangle 17">
+            <a:extLst>
+              <a:ext uri="{FF2B5EF4-FFF2-40B4-BE49-F238E27FC236}">
+                <a16:creationId xmlns:a16="http://schemas.microsoft.com/office/drawing/2014/main" id="{D2197C10-5034-9381-1417-5A438589ADE1}"/>
+              </a:ext>
+            </a:extLst>
+          </p:cNvPr>
+          <p:cNvSpPr/>
+          <p:nvPr/>
+        </p:nvSpPr>
+        <p:spPr>
+          <a:xfrm>
+            <a:off x="1378314" y="5216529"/>
+            <a:ext cx="1508424" cy="238339"/>
+          </a:xfrm>
+          <a:prstGeom prst="rect">
+            <a:avLst/>
+          </a:prstGeom>
+        </p:spPr>
+        <p:style>
+          <a:lnRef idx="2">
+            <a:schemeClr val="accent1">
+              <a:shade val="15000"/>
+            </a:schemeClr>
+          </a:lnRef>
+          <a:fillRef idx="1">
+            <a:schemeClr val="accent1"/>
+          </a:fillRef>
+          <a:effectRef idx="0">
+            <a:schemeClr val="accent1"/>
+          </a:effectRef>
+          <a:fontRef idx="minor">
+            <a:schemeClr val="lt1"/>
+          </a:fontRef>
+        </p:style>
+        <p:txBody>
+          <a:bodyPr vert="horz" rtlCol="0" anchor="ctr"/>
+          <a:lstStyle/>
+          <a:p>
+            <a:pPr algn="ctr"/>
+            <a:r>
+              <a:rPr lang="en-US" sz="1100" dirty="0"/>
+              <a:t>Communications Agent</a:t>
+            </a:r>
+          </a:p>
+        </p:txBody>
+      </p:sp>
+      <p:sp>
+        <p:nvSpPr>
+          <p:cNvPr id="20" name="Internal Storage 19">
+            <a:extLst>
+              <a:ext uri="{FF2B5EF4-FFF2-40B4-BE49-F238E27FC236}">
+                <a16:creationId xmlns:a16="http://schemas.microsoft.com/office/drawing/2014/main" id="{0B2CCCFB-96A1-C308-0165-B9032FB18335}"/>
+              </a:ext>
+            </a:extLst>
+          </p:cNvPr>
+          <p:cNvSpPr/>
+          <p:nvPr/>
+        </p:nvSpPr>
+        <p:spPr>
+          <a:xfrm>
+            <a:off x="9434726" y="2489236"/>
+            <a:ext cx="703624" cy="424469"/>
+          </a:xfrm>
+          <a:prstGeom prst="flowChartInternalStorage">
+            <a:avLst/>
+          </a:prstGeom>
+          <a:solidFill>
+            <a:schemeClr val="tx2">
+              <a:lumMod val="20000"/>
+              <a:lumOff val="80000"/>
+            </a:schemeClr>
+          </a:solidFill>
+        </p:spPr>
+        <p:style>
+          <a:lnRef idx="2">
+            <a:schemeClr val="accent1">
+              <a:shade val="15000"/>
+            </a:schemeClr>
+          </a:lnRef>
+          <a:fillRef idx="1">
+            <a:schemeClr val="accent1"/>
+          </a:fillRef>
+          <a:effectRef idx="0">
+            <a:schemeClr val="accent1"/>
+          </a:effectRef>
+          <a:fontRef idx="minor">
+            <a:schemeClr val="lt1"/>
+          </a:fontRef>
+        </p:style>
+        <p:txBody>
+          <a:bodyPr lIns="0" tIns="0" rIns="0" bIns="0" rtlCol="0" anchor="ctr"/>
+          <a:lstStyle/>
+          <a:p>
+            <a:pPr algn="ctr"/>
+            <a:r>
+              <a:rPr lang="en-US" sz="1000" b="1" dirty="0">
+                <a:solidFill>
+                  <a:schemeClr val="tx1">
+                    <a:lumMod val="65000"/>
+                    <a:lumOff val="35000"/>
+                  </a:schemeClr>
+                </a:solidFill>
+              </a:rPr>
+              <a:t>Inventory</a:t>
             </a:r>
           </a:p>
         </p:txBody>
       </p:sp>
       <p:pic>
         <p:nvPicPr>
-          <p:cNvPr id="11" name="Picture 10">
-            <a:extLst>
-              <a:ext uri="{FF2B5EF4-FFF2-40B4-BE49-F238E27FC236}">
-                <a16:creationId xmlns:a16="http://schemas.microsoft.com/office/drawing/2014/main" id="{34E7A47E-D23F-34EC-9E1A-B226F8ABB57F}"/>
+          <p:cNvPr id="1030" name="Picture 6" descr="Internet (global network icon) premium ...">
+            <a:extLst>
+              <a:ext uri="{FF2B5EF4-FFF2-40B4-BE49-F238E27FC236}">
+                <a16:creationId xmlns:a16="http://schemas.microsoft.com/office/drawing/2014/main" id="{B3A097C0-4036-FC5A-E485-C04EC7F7513A}"/>
               </a:ext>
             </a:extLst>
           </p:cNvPr>
           <p:cNvPicPr>
-            <a:picLocks noChangeAspect="1"/>
+            <a:picLocks noChangeAspect="1" noChangeArrowheads="1"/>
           </p:cNvPicPr>
           <p:nvPr/>
         </p:nvPicPr>
         <p:blipFill>
-          <a:blip r:embed="rId2"/>
+          <a:blip r:embed="rId4">
+            <a:extLst>
+              <a:ext uri="{28A0092B-C50C-407E-A947-70E740481C1C}">
+                <a14:useLocalDpi xmlns:a14="http://schemas.microsoft.com/office/drawing/2010/main" val="0"/>
+              </a:ext>
+            </a:extLst>
+          </a:blip>
+          <a:srcRect/>
           <a:stretch>
             <a:fillRect/>
           </a:stretch>
         </p:blipFill>
-        <p:spPr>
-          <a:xfrm>
-            <a:off x="2187448" y="1340703"/>
-            <a:ext cx="9825609" cy="4877562"/>
+        <p:spPr bwMode="auto">
+          <a:xfrm>
+            <a:off x="9520503" y="3242526"/>
+            <a:ext cx="548640" cy="556021"/>
           </a:xfrm>
           <a:prstGeom prst="rect">
             <a:avLst/>
           </a:prstGeom>
-          <a:effectLst>
-            <a:glow rad="101600">
-              <a:schemeClr val="accent5">
-                <a:satMod val="175000"/>
-                <a:alpha val="40000"/>
-              </a:schemeClr>
-            </a:glow>
-          </a:effectLst>
+          <a:noFill/>
+          <a:extLst>
+            <a:ext uri="{909E8E84-426E-40DD-AFC4-6F175D3DCCD1}">
+              <a14:hiddenFill xmlns:a14="http://schemas.microsoft.com/office/drawing/2010/main">
+                <a:solidFill>
+                  <a:srgbClr val="FFFFFF"/>
+                </a:solidFill>
+              </a14:hiddenFill>
+            </a:ext>
+          </a:extLst>
         </p:spPr>
       </p:pic>
+      <p:pic>
+        <p:nvPicPr>
+          <p:cNvPr id="1032" name="Picture 8" descr="File - Free icons">
+            <a:extLst>
+              <a:ext uri="{FF2B5EF4-FFF2-40B4-BE49-F238E27FC236}">
+                <a16:creationId xmlns:a16="http://schemas.microsoft.com/office/drawing/2014/main" id="{12D6F077-89C4-D508-43A2-5AED9A36D3DC}"/>
+              </a:ext>
+            </a:extLst>
+          </p:cNvPr>
+          <p:cNvPicPr>
+            <a:picLocks noChangeAspect="1" noChangeArrowheads="1"/>
+          </p:cNvPicPr>
+          <p:nvPr/>
+        </p:nvPicPr>
+        <p:blipFill>
+          <a:blip r:embed="rId5">
+            <a:extLst>
+              <a:ext uri="{28A0092B-C50C-407E-A947-70E740481C1C}">
+                <a14:useLocalDpi xmlns:a14="http://schemas.microsoft.com/office/drawing/2010/main" val="0"/>
+              </a:ext>
+            </a:extLst>
+          </a:blip>
+          <a:srcRect/>
+          <a:stretch>
+            <a:fillRect/>
+          </a:stretch>
+        </p:blipFill>
+        <p:spPr bwMode="auto">
+          <a:xfrm>
+            <a:off x="9520503" y="4162157"/>
+            <a:ext cx="594094" cy="594094"/>
+          </a:xfrm>
+          <a:prstGeom prst="rect">
+            <a:avLst/>
+          </a:prstGeom>
+          <a:noFill/>
+          <a:extLst>
+            <a:ext uri="{909E8E84-426E-40DD-AFC4-6F175D3DCCD1}">
+              <a14:hiddenFill xmlns:a14="http://schemas.microsoft.com/office/drawing/2010/main">
+                <a:solidFill>
+                  <a:srgbClr val="FFFFFF"/>
+                </a:solidFill>
+              </a14:hiddenFill>
+            </a:ext>
+          </a:extLst>
+        </p:spPr>
+      </p:pic>
+      <p:pic>
+        <p:nvPicPr>
+          <p:cNvPr id="1034" name="Picture 10" descr="Send Mail - Free communications icons">
+            <a:extLst>
+              <a:ext uri="{FF2B5EF4-FFF2-40B4-BE49-F238E27FC236}">
+                <a16:creationId xmlns:a16="http://schemas.microsoft.com/office/drawing/2014/main" id="{0285715F-6542-BC36-F11F-181448732ADD}"/>
+              </a:ext>
+            </a:extLst>
+          </p:cNvPr>
+          <p:cNvPicPr>
+            <a:picLocks noChangeAspect="1" noChangeArrowheads="1"/>
+          </p:cNvPicPr>
+          <p:nvPr/>
+        </p:nvPicPr>
+        <p:blipFill>
+          <a:blip r:embed="rId6">
+            <a:extLst>
+              <a:ext uri="{28A0092B-C50C-407E-A947-70E740481C1C}">
+                <a14:useLocalDpi xmlns:a14="http://schemas.microsoft.com/office/drawing/2010/main" val="0"/>
+              </a:ext>
+            </a:extLst>
+          </a:blip>
+          <a:srcRect/>
+          <a:stretch>
+            <a:fillRect/>
+          </a:stretch>
+        </p:blipFill>
+        <p:spPr bwMode="auto">
+          <a:xfrm>
+            <a:off x="9489491" y="5347498"/>
+            <a:ext cx="594093" cy="594093"/>
+          </a:xfrm>
+          <a:prstGeom prst="rect">
+            <a:avLst/>
+          </a:prstGeom>
+          <a:noFill/>
+          <a:extLst>
+            <a:ext uri="{909E8E84-426E-40DD-AFC4-6F175D3DCCD1}">
+              <a14:hiddenFill xmlns:a14="http://schemas.microsoft.com/office/drawing/2010/main">
+                <a:solidFill>
+                  <a:srgbClr val="FFFFFF"/>
+                </a:solidFill>
+              </a14:hiddenFill>
+            </a:ext>
+          </a:extLst>
+        </p:spPr>
+      </p:pic>
+      <p:sp>
+        <p:nvSpPr>
+          <p:cNvPr id="21" name="TextBox 20">
+            <a:extLst>
+              <a:ext uri="{FF2B5EF4-FFF2-40B4-BE49-F238E27FC236}">
+                <a16:creationId xmlns:a16="http://schemas.microsoft.com/office/drawing/2014/main" id="{3A8BD865-0897-D384-61D7-46EBD65DF901}"/>
+              </a:ext>
+            </a:extLst>
+          </p:cNvPr>
+          <p:cNvSpPr txBox="1"/>
+          <p:nvPr/>
+        </p:nvSpPr>
+        <p:spPr>
+          <a:xfrm>
+            <a:off x="9073842" y="4724380"/>
+            <a:ext cx="1425390" cy="261610"/>
+          </a:xfrm>
+          <a:prstGeom prst="rect">
+            <a:avLst/>
+          </a:prstGeom>
+          <a:noFill/>
+        </p:spPr>
+        <p:txBody>
+          <a:bodyPr wrap="none" rtlCol="0">
+            <a:spAutoFit/>
+          </a:bodyPr>
+          <a:lstStyle/>
+          <a:p>
+            <a:r>
+              <a:rPr lang="en-US" sz="1100" dirty="0"/>
+              <a:t>Multi years sales data</a:t>
+            </a:r>
+          </a:p>
+        </p:txBody>
+      </p:sp>
+      <p:sp>
+        <p:nvSpPr>
+          <p:cNvPr id="22" name="Rounded Rectangle 21">
+            <a:extLst>
+              <a:ext uri="{FF2B5EF4-FFF2-40B4-BE49-F238E27FC236}">
+                <a16:creationId xmlns:a16="http://schemas.microsoft.com/office/drawing/2014/main" id="{10B242C4-ACDD-807D-728F-DD3B5FE6FC17}"/>
+              </a:ext>
+            </a:extLst>
+          </p:cNvPr>
+          <p:cNvSpPr/>
+          <p:nvPr/>
+        </p:nvSpPr>
+        <p:spPr>
+          <a:xfrm>
+            <a:off x="6013178" y="1715631"/>
+            <a:ext cx="1758534" cy="4465671"/>
+          </a:xfrm>
+          <a:prstGeom prst="roundRect">
+            <a:avLst>
+              <a:gd name="adj" fmla="val 4151"/>
+            </a:avLst>
+          </a:prstGeom>
+          <a:noFill/>
+          <a:ln>
+            <a:prstDash val="dash"/>
+          </a:ln>
+        </p:spPr>
+        <p:style>
+          <a:lnRef idx="2">
+            <a:schemeClr val="accent1">
+              <a:shade val="15000"/>
+            </a:schemeClr>
+          </a:lnRef>
+          <a:fillRef idx="1">
+            <a:schemeClr val="accent1"/>
+          </a:fillRef>
+          <a:effectRef idx="0">
+            <a:schemeClr val="accent1"/>
+          </a:effectRef>
+          <a:fontRef idx="minor">
+            <a:schemeClr val="lt1"/>
+          </a:fontRef>
+        </p:style>
+        <p:txBody>
+          <a:bodyPr rtlCol="0" anchor="ctr"/>
+          <a:lstStyle/>
+          <a:p>
+            <a:pPr algn="ctr"/>
+            <a:endParaRPr lang="en-US"/>
+          </a:p>
+        </p:txBody>
+      </p:sp>
+      <p:sp>
+        <p:nvSpPr>
+          <p:cNvPr id="23" name="Rounded Rectangle 22">
+            <a:extLst>
+              <a:ext uri="{FF2B5EF4-FFF2-40B4-BE49-F238E27FC236}">
+                <a16:creationId xmlns:a16="http://schemas.microsoft.com/office/drawing/2014/main" id="{E69DF7BA-0094-8B33-5801-B1ED4EF5CDBF}"/>
+              </a:ext>
+            </a:extLst>
+          </p:cNvPr>
+          <p:cNvSpPr/>
+          <p:nvPr/>
+        </p:nvSpPr>
+        <p:spPr>
+          <a:xfrm>
+            <a:off x="8836681" y="1715631"/>
+            <a:ext cx="1758534" cy="4465671"/>
+          </a:xfrm>
+          <a:prstGeom prst="roundRect">
+            <a:avLst>
+              <a:gd name="adj" fmla="val 4151"/>
+            </a:avLst>
+          </a:prstGeom>
+          <a:noFill/>
+          <a:ln>
+            <a:prstDash val="dash"/>
+          </a:ln>
+        </p:spPr>
+        <p:style>
+          <a:lnRef idx="2">
+            <a:schemeClr val="accent1">
+              <a:shade val="15000"/>
+            </a:schemeClr>
+          </a:lnRef>
+          <a:fillRef idx="1">
+            <a:schemeClr val="accent1"/>
+          </a:fillRef>
+          <a:effectRef idx="0">
+            <a:schemeClr val="accent1"/>
+          </a:effectRef>
+          <a:fontRef idx="minor">
+            <a:schemeClr val="lt1"/>
+          </a:fontRef>
+        </p:style>
+        <p:txBody>
+          <a:bodyPr rtlCol="0" anchor="ctr"/>
+          <a:lstStyle/>
+          <a:p>
+            <a:pPr algn="ctr"/>
+            <a:endParaRPr lang="en-US"/>
+          </a:p>
+        </p:txBody>
+      </p:sp>
+      <p:pic>
+        <p:nvPicPr>
+          <p:cNvPr id="24" name="Picture 4" descr="openai&quot; Icon - Download for free – Iconduck">
+            <a:extLst>
+              <a:ext uri="{FF2B5EF4-FFF2-40B4-BE49-F238E27FC236}">
+                <a16:creationId xmlns:a16="http://schemas.microsoft.com/office/drawing/2014/main" id="{8D2254CC-8037-E5DC-DF67-78543E5B6BF8}"/>
+              </a:ext>
+            </a:extLst>
+          </p:cNvPr>
+          <p:cNvPicPr>
+            <a:picLocks noChangeAspect="1" noChangeArrowheads="1"/>
+          </p:cNvPicPr>
+          <p:nvPr/>
+        </p:nvPicPr>
+        <p:blipFill>
+          <a:blip r:embed="rId3">
+            <a:extLst>
+              <a:ext uri="{28A0092B-C50C-407E-A947-70E740481C1C}">
+                <a14:useLocalDpi xmlns:a14="http://schemas.microsoft.com/office/drawing/2010/main" val="0"/>
+              </a:ext>
+            </a:extLst>
+          </a:blip>
+          <a:srcRect/>
+          <a:stretch>
+            <a:fillRect/>
+          </a:stretch>
+        </p:blipFill>
+        <p:spPr bwMode="auto">
+          <a:xfrm>
+            <a:off x="7652551" y="1601710"/>
+            <a:ext cx="238322" cy="241527"/>
+          </a:xfrm>
+          <a:prstGeom prst="rect">
+            <a:avLst/>
+          </a:prstGeom>
+          <a:noFill/>
+          <a:extLst>
+            <a:ext uri="{909E8E84-426E-40DD-AFC4-6F175D3DCCD1}">
+              <a14:hiddenFill xmlns:a14="http://schemas.microsoft.com/office/drawing/2010/main">
+                <a:solidFill>
+                  <a:srgbClr val="FFFFFF"/>
+                </a:solidFill>
+              </a14:hiddenFill>
+            </a:ext>
+          </a:extLst>
+        </p:spPr>
+      </p:pic>
+      <p:sp>
+        <p:nvSpPr>
+          <p:cNvPr id="26" name="TextBox 25">
+            <a:extLst>
+              <a:ext uri="{FF2B5EF4-FFF2-40B4-BE49-F238E27FC236}">
+                <a16:creationId xmlns:a16="http://schemas.microsoft.com/office/drawing/2014/main" id="{98E89F51-5035-54B4-F507-BED780443E9F}"/>
+              </a:ext>
+            </a:extLst>
+          </p:cNvPr>
+          <p:cNvSpPr txBox="1"/>
+          <p:nvPr/>
+        </p:nvSpPr>
+        <p:spPr>
+          <a:xfrm>
+            <a:off x="6189832" y="2675366"/>
+            <a:ext cx="1424763" cy="307777"/>
+          </a:xfrm>
+          <a:prstGeom prst="rect">
+            <a:avLst/>
+          </a:prstGeom>
+          <a:noFill/>
+        </p:spPr>
+        <p:txBody>
+          <a:bodyPr wrap="square">
+            <a:spAutoFit/>
+          </a:bodyPr>
+          <a:lstStyle/>
+          <a:p>
+            <a:pPr algn="ctr"/>
+            <a:r>
+              <a:rPr lang="en-US" sz="1400" b="0" i="0" dirty="0">
+                <a:effectLst/>
+                <a:latin typeface="OpenAI Sans"/>
+              </a:rPr>
+              <a:t>gpt-4o-mini</a:t>
+            </a:r>
+            <a:endParaRPr lang="en-US" sz="1400" dirty="0"/>
+          </a:p>
+        </p:txBody>
+      </p:sp>
+      <p:sp>
+        <p:nvSpPr>
+          <p:cNvPr id="27" name="TextBox 26">
+            <a:extLst>
+              <a:ext uri="{FF2B5EF4-FFF2-40B4-BE49-F238E27FC236}">
+                <a16:creationId xmlns:a16="http://schemas.microsoft.com/office/drawing/2014/main" id="{231C6C39-0895-6717-DAB8-2A6080F80C53}"/>
+              </a:ext>
+            </a:extLst>
+          </p:cNvPr>
+          <p:cNvSpPr txBox="1"/>
+          <p:nvPr/>
+        </p:nvSpPr>
+        <p:spPr>
+          <a:xfrm>
+            <a:off x="6180063" y="3845196"/>
+            <a:ext cx="1424763" cy="307777"/>
+          </a:xfrm>
+          <a:prstGeom prst="rect">
+            <a:avLst/>
+          </a:prstGeom>
+          <a:noFill/>
+        </p:spPr>
+        <p:txBody>
+          <a:bodyPr wrap="square">
+            <a:spAutoFit/>
+          </a:bodyPr>
+          <a:lstStyle/>
+          <a:p>
+            <a:pPr algn="ctr"/>
+            <a:r>
+              <a:rPr lang="en-US" sz="1400" b="0" i="0" dirty="0">
+                <a:effectLst/>
+                <a:latin typeface="OpenAI Sans"/>
+              </a:rPr>
+              <a:t>gpt-4o</a:t>
+            </a:r>
+            <a:endParaRPr lang="en-US" sz="1400" dirty="0"/>
+          </a:p>
+        </p:txBody>
+      </p:sp>
+      <p:sp>
+        <p:nvSpPr>
+          <p:cNvPr id="28" name="TextBox 27">
+            <a:extLst>
+              <a:ext uri="{FF2B5EF4-FFF2-40B4-BE49-F238E27FC236}">
+                <a16:creationId xmlns:a16="http://schemas.microsoft.com/office/drawing/2014/main" id="{DE1E2EC2-6CF2-1E81-8283-7620E13F9EB0}"/>
+              </a:ext>
+            </a:extLst>
+          </p:cNvPr>
+          <p:cNvSpPr txBox="1"/>
+          <p:nvPr/>
+        </p:nvSpPr>
+        <p:spPr>
+          <a:xfrm>
+            <a:off x="6189831" y="5027922"/>
+            <a:ext cx="1424763" cy="307777"/>
+          </a:xfrm>
+          <a:prstGeom prst="rect">
+            <a:avLst/>
+          </a:prstGeom>
+          <a:noFill/>
+        </p:spPr>
+        <p:txBody>
+          <a:bodyPr wrap="square">
+            <a:spAutoFit/>
+          </a:bodyPr>
+          <a:lstStyle/>
+          <a:p>
+            <a:pPr algn="ctr"/>
+            <a:r>
+              <a:rPr lang="en-US" sz="1400" b="0" i="0" dirty="0">
+                <a:effectLst/>
+                <a:latin typeface="OpenAI Sans"/>
+              </a:rPr>
+              <a:t>gpt-4-turbo</a:t>
+            </a:r>
+            <a:endParaRPr lang="en-US" sz="1400" dirty="0"/>
+          </a:p>
+        </p:txBody>
+      </p:sp>
+      <p:cxnSp>
+        <p:nvCxnSpPr>
+          <p:cNvPr id="30" name="Curved Connector 29">
+            <a:extLst>
+              <a:ext uri="{FF2B5EF4-FFF2-40B4-BE49-F238E27FC236}">
+                <a16:creationId xmlns:a16="http://schemas.microsoft.com/office/drawing/2014/main" id="{3779E385-A685-A3EF-E46F-EDBF038FB3AC}"/>
+              </a:ext>
+            </a:extLst>
+          </p:cNvPr>
+          <p:cNvCxnSpPr>
+            <a:cxnSpLocks/>
+            <a:stCxn id="15" idx="3"/>
+            <a:endCxn id="22" idx="1"/>
+          </p:cNvCxnSpPr>
+          <p:nvPr/>
+        </p:nvCxnSpPr>
+        <p:spPr>
+          <a:xfrm>
+            <a:off x="2873163" y="2794536"/>
+            <a:ext cx="3140015" cy="1153931"/>
+          </a:xfrm>
+          <a:prstGeom prst="curvedConnector3">
+            <a:avLst/>
+          </a:prstGeom>
+          <a:ln>
+            <a:tailEnd type="triangle"/>
+          </a:ln>
+        </p:spPr>
+        <p:style>
+          <a:lnRef idx="1">
+            <a:schemeClr val="accent1"/>
+          </a:lnRef>
+          <a:fillRef idx="0">
+            <a:schemeClr val="accent1"/>
+          </a:fillRef>
+          <a:effectRef idx="0">
+            <a:schemeClr val="accent1"/>
+          </a:effectRef>
+          <a:fontRef idx="minor">
+            <a:schemeClr val="tx1"/>
+          </a:fontRef>
+        </p:style>
+      </p:cxnSp>
+      <p:cxnSp>
+        <p:nvCxnSpPr>
+          <p:cNvPr id="31" name="Curved Connector 30">
+            <a:extLst>
+              <a:ext uri="{FF2B5EF4-FFF2-40B4-BE49-F238E27FC236}">
+                <a16:creationId xmlns:a16="http://schemas.microsoft.com/office/drawing/2014/main" id="{C89FAD76-77B2-557B-45E8-D98328D37D98}"/>
+              </a:ext>
+            </a:extLst>
+          </p:cNvPr>
+          <p:cNvCxnSpPr>
+            <a:cxnSpLocks/>
+            <a:stCxn id="26" idx="3"/>
+            <a:endCxn id="20" idx="1"/>
+          </p:cNvCxnSpPr>
+          <p:nvPr/>
+        </p:nvCxnSpPr>
+        <p:spPr>
+          <a:xfrm flipV="1">
+            <a:off x="7614595" y="2701471"/>
+            <a:ext cx="1820131" cy="127784"/>
+          </a:xfrm>
+          <a:prstGeom prst="curvedConnector3">
+            <a:avLst/>
+          </a:prstGeom>
+          <a:ln>
+            <a:tailEnd type="triangle"/>
+          </a:ln>
+        </p:spPr>
+        <p:style>
+          <a:lnRef idx="1">
+            <a:schemeClr val="accent1"/>
+          </a:lnRef>
+          <a:fillRef idx="0">
+            <a:schemeClr val="accent1"/>
+          </a:fillRef>
+          <a:effectRef idx="0">
+            <a:schemeClr val="accent1"/>
+          </a:effectRef>
+          <a:fontRef idx="minor">
+            <a:schemeClr val="tx1"/>
+          </a:fontRef>
+        </p:style>
+      </p:cxnSp>
+      <p:cxnSp>
+        <p:nvCxnSpPr>
+          <p:cNvPr id="35" name="Curved Connector 34">
+            <a:extLst>
+              <a:ext uri="{FF2B5EF4-FFF2-40B4-BE49-F238E27FC236}">
+                <a16:creationId xmlns:a16="http://schemas.microsoft.com/office/drawing/2014/main" id="{63C27F22-2A34-1141-6F1A-9B8F52795ADA}"/>
+              </a:ext>
+            </a:extLst>
+          </p:cNvPr>
+          <p:cNvCxnSpPr>
+            <a:cxnSpLocks/>
+            <a:stCxn id="16" idx="3"/>
+            <a:endCxn id="22" idx="1"/>
+          </p:cNvCxnSpPr>
+          <p:nvPr/>
+        </p:nvCxnSpPr>
+        <p:spPr>
+          <a:xfrm>
+            <a:off x="2905513" y="3670459"/>
+            <a:ext cx="3107665" cy="278008"/>
+          </a:xfrm>
+          <a:prstGeom prst="curvedConnector3">
+            <a:avLst/>
+          </a:prstGeom>
+          <a:ln>
+            <a:tailEnd type="triangle"/>
+          </a:ln>
+        </p:spPr>
+        <p:style>
+          <a:lnRef idx="1">
+            <a:schemeClr val="accent1"/>
+          </a:lnRef>
+          <a:fillRef idx="0">
+            <a:schemeClr val="accent1"/>
+          </a:fillRef>
+          <a:effectRef idx="0">
+            <a:schemeClr val="accent1"/>
+          </a:effectRef>
+          <a:fontRef idx="minor">
+            <a:schemeClr val="tx1"/>
+          </a:fontRef>
+        </p:style>
+      </p:cxnSp>
     </p:spTree>
     <p:extLst>
       <p:ext uri="{BB962C8B-B14F-4D97-AF65-F5344CB8AC3E}">
-        <p14:creationId xmlns:p14="http://schemas.microsoft.com/office/powerpoint/2010/main" val="1347280084"/>
+        <p14:creationId xmlns:p14="http://schemas.microsoft.com/office/powerpoint/2010/main" val="2444446996"/>
       </p:ext>
     </p:extLst>
   </p:cSld>
@@ -7808,10 +9055,10 @@
       </p:grpSpPr>
       <p:sp>
         <p:nvSpPr>
-          <p:cNvPr id="4" name="TextBox 3">
-            <a:extLst>
-              <a:ext uri="{FF2B5EF4-FFF2-40B4-BE49-F238E27FC236}">
-                <a16:creationId xmlns:a16="http://schemas.microsoft.com/office/drawing/2014/main" id="{0B205ED7-CA2A-2FFE-8AF6-7C1545C8E1FC}"/>
+          <p:cNvPr id="3" name="TextBox 2">
+            <a:extLst>
+              <a:ext uri="{FF2B5EF4-FFF2-40B4-BE49-F238E27FC236}">
+                <a16:creationId xmlns:a16="http://schemas.microsoft.com/office/drawing/2014/main" id="{61F52439-6AF5-5D38-D5D2-5AB934AE383A}"/>
               </a:ext>
             </a:extLst>
           </p:cNvPr>
@@ -7820,8 +9067,8 @@
         </p:nvSpPr>
         <p:spPr>
           <a:xfrm>
-            <a:off x="378314" y="2719180"/>
-            <a:ext cx="2204065" cy="461665"/>
+            <a:off x="299655" y="74303"/>
+            <a:ext cx="729430" cy="461665"/>
           </a:xfrm>
           <a:prstGeom prst="rect">
             <a:avLst/>
@@ -7836,17 +9083,17 @@
           <a:p>
             <a:r>
               <a:rPr lang="en-US" sz="2400" dirty="0"/>
-              <a:t>Agent Workflow</a:t>
+              <a:t>Cost</a:t>
             </a:r>
           </a:p>
         </p:txBody>
       </p:sp>
       <p:cxnSp>
         <p:nvCxnSpPr>
-          <p:cNvPr id="2" name="Straight Connector 1">
-            <a:extLst>
-              <a:ext uri="{FF2B5EF4-FFF2-40B4-BE49-F238E27FC236}">
-                <a16:creationId xmlns:a16="http://schemas.microsoft.com/office/drawing/2014/main" id="{89154393-A6FF-CF4B-8A1D-57D7E90FAC33}"/>
+          <p:cNvPr id="5" name="Straight Connector 4">
+            <a:extLst>
+              <a:ext uri="{FF2B5EF4-FFF2-40B4-BE49-F238E27FC236}">
+                <a16:creationId xmlns:a16="http://schemas.microsoft.com/office/drawing/2014/main" id="{E9EF8585-FC8F-D680-0FDC-8831BAB64670}"/>
               </a:ext>
             </a:extLst>
           </p:cNvPr>
@@ -7855,7 +9102,7 @@
         </p:nvCxnSpPr>
         <p:spPr>
           <a:xfrm>
-            <a:off x="432619" y="3156155"/>
+            <a:off x="432619" y="545800"/>
             <a:ext cx="11759381" cy="0"/>
           </a:xfrm>
           <a:prstGeom prst="line">
@@ -7877,10 +9124,249 @@
           </a:fontRef>
         </p:style>
       </p:cxnSp>
+      <p:sp>
+        <p:nvSpPr>
+          <p:cNvPr id="8" name="Rectangle 7">
+            <a:extLst>
+              <a:ext uri="{FF2B5EF4-FFF2-40B4-BE49-F238E27FC236}">
+                <a16:creationId xmlns:a16="http://schemas.microsoft.com/office/drawing/2014/main" id="{B050F634-6B01-D651-D1B1-F2FADA24BA4C}"/>
+              </a:ext>
+            </a:extLst>
+          </p:cNvPr>
+          <p:cNvSpPr/>
+          <p:nvPr/>
+        </p:nvSpPr>
+        <p:spPr>
+          <a:xfrm>
+            <a:off x="178943" y="1885010"/>
+            <a:ext cx="1753444" cy="806246"/>
+          </a:xfrm>
+          <a:prstGeom prst="rect">
+            <a:avLst/>
+          </a:prstGeom>
+          <a:solidFill>
+            <a:srgbClr val="002060"/>
+          </a:solidFill>
+          <a:effectLst>
+            <a:glow rad="101600">
+              <a:schemeClr val="accent2">
+                <a:satMod val="175000"/>
+                <a:alpha val="40000"/>
+              </a:schemeClr>
+            </a:glow>
+          </a:effectLst>
+        </p:spPr>
+        <p:style>
+          <a:lnRef idx="2">
+            <a:schemeClr val="accent1">
+              <a:shade val="15000"/>
+            </a:schemeClr>
+          </a:lnRef>
+          <a:fillRef idx="1">
+            <a:schemeClr val="accent1"/>
+          </a:fillRef>
+          <a:effectRef idx="0">
+            <a:schemeClr val="accent1"/>
+          </a:effectRef>
+          <a:fontRef idx="minor">
+            <a:schemeClr val="lt1"/>
+          </a:fontRef>
+        </p:style>
+        <p:txBody>
+          <a:bodyPr rtlCol="0" anchor="ctr"/>
+          <a:lstStyle/>
+          <a:p>
+            <a:pPr algn="ctr"/>
+            <a:r>
+              <a:rPr lang="en-US" sz="2000" dirty="0"/>
+              <a:t>Total Tokens </a:t>
+            </a:r>
+          </a:p>
+          <a:p>
+            <a:pPr algn="ctr"/>
+            <a:r>
+              <a:rPr lang="en-US" sz="2000" dirty="0"/>
+              <a:t>2,562,236</a:t>
+            </a:r>
+          </a:p>
+        </p:txBody>
+      </p:sp>
+      <p:sp>
+        <p:nvSpPr>
+          <p:cNvPr id="9" name="Rectangle 8">
+            <a:extLst>
+              <a:ext uri="{FF2B5EF4-FFF2-40B4-BE49-F238E27FC236}">
+                <a16:creationId xmlns:a16="http://schemas.microsoft.com/office/drawing/2014/main" id="{B20A5704-18BF-DBC0-3A0B-B8EA205E7D2F}"/>
+              </a:ext>
+            </a:extLst>
+          </p:cNvPr>
+          <p:cNvSpPr/>
+          <p:nvPr/>
+        </p:nvSpPr>
+        <p:spPr>
+          <a:xfrm>
+            <a:off x="178943" y="3181170"/>
+            <a:ext cx="1753444" cy="806246"/>
+          </a:xfrm>
+          <a:prstGeom prst="rect">
+            <a:avLst/>
+          </a:prstGeom>
+          <a:solidFill>
+            <a:srgbClr val="002060"/>
+          </a:solidFill>
+          <a:effectLst>
+            <a:glow rad="101600">
+              <a:schemeClr val="accent2">
+                <a:satMod val="175000"/>
+                <a:alpha val="40000"/>
+              </a:schemeClr>
+            </a:glow>
+          </a:effectLst>
+        </p:spPr>
+        <p:style>
+          <a:lnRef idx="2">
+            <a:schemeClr val="accent1">
+              <a:shade val="15000"/>
+            </a:schemeClr>
+          </a:lnRef>
+          <a:fillRef idx="1">
+            <a:schemeClr val="accent1"/>
+          </a:fillRef>
+          <a:effectRef idx="0">
+            <a:schemeClr val="accent1"/>
+          </a:effectRef>
+          <a:fontRef idx="minor">
+            <a:schemeClr val="lt1"/>
+          </a:fontRef>
+        </p:style>
+        <p:txBody>
+          <a:bodyPr rtlCol="0" anchor="ctr"/>
+          <a:lstStyle/>
+          <a:p>
+            <a:pPr algn="ctr"/>
+            <a:r>
+              <a:rPr lang="en-US" sz="2000" dirty="0"/>
+              <a:t>Total Requests </a:t>
+            </a:r>
+          </a:p>
+          <a:p>
+            <a:pPr algn="ctr"/>
+            <a:r>
+              <a:rPr lang="en-US" sz="2000" dirty="0"/>
+              <a:t>777</a:t>
+            </a:r>
+          </a:p>
+        </p:txBody>
+      </p:sp>
+      <p:sp>
+        <p:nvSpPr>
+          <p:cNvPr id="10" name="Rectangle 9">
+            <a:extLst>
+              <a:ext uri="{FF2B5EF4-FFF2-40B4-BE49-F238E27FC236}">
+                <a16:creationId xmlns:a16="http://schemas.microsoft.com/office/drawing/2014/main" id="{DC5CB9B1-154A-7E14-1F77-4FEAD148634D}"/>
+              </a:ext>
+            </a:extLst>
+          </p:cNvPr>
+          <p:cNvSpPr/>
+          <p:nvPr/>
+        </p:nvSpPr>
+        <p:spPr>
+          <a:xfrm>
+            <a:off x="178943" y="4382729"/>
+            <a:ext cx="1753444" cy="806246"/>
+          </a:xfrm>
+          <a:prstGeom prst="rect">
+            <a:avLst/>
+          </a:prstGeom>
+          <a:solidFill>
+            <a:srgbClr val="002060"/>
+          </a:solidFill>
+          <a:effectLst>
+            <a:glow rad="101600">
+              <a:schemeClr val="accent2">
+                <a:satMod val="175000"/>
+                <a:alpha val="40000"/>
+              </a:schemeClr>
+            </a:glow>
+          </a:effectLst>
+        </p:spPr>
+        <p:style>
+          <a:lnRef idx="2">
+            <a:schemeClr val="accent1">
+              <a:shade val="15000"/>
+            </a:schemeClr>
+          </a:lnRef>
+          <a:fillRef idx="1">
+            <a:schemeClr val="accent1"/>
+          </a:fillRef>
+          <a:effectRef idx="0">
+            <a:schemeClr val="accent1"/>
+          </a:effectRef>
+          <a:fontRef idx="minor">
+            <a:schemeClr val="lt1"/>
+          </a:fontRef>
+        </p:style>
+        <p:txBody>
+          <a:bodyPr rtlCol="0" anchor="ctr"/>
+          <a:lstStyle/>
+          <a:p>
+            <a:pPr algn="ctr"/>
+            <a:r>
+              <a:rPr lang="en-US" sz="2000" dirty="0"/>
+              <a:t>Total Spent </a:t>
+            </a:r>
+          </a:p>
+          <a:p>
+            <a:pPr algn="ctr"/>
+            <a:r>
+              <a:rPr lang="en-US" sz="2800" dirty="0"/>
+              <a:t>$5.28</a:t>
+            </a:r>
+          </a:p>
+        </p:txBody>
+      </p:sp>
+      <p:pic>
+        <p:nvPicPr>
+          <p:cNvPr id="11" name="Picture 10">
+            <a:extLst>
+              <a:ext uri="{FF2B5EF4-FFF2-40B4-BE49-F238E27FC236}">
+                <a16:creationId xmlns:a16="http://schemas.microsoft.com/office/drawing/2014/main" id="{34E7A47E-D23F-34EC-9E1A-B226F8ABB57F}"/>
+              </a:ext>
+            </a:extLst>
+          </p:cNvPr>
+          <p:cNvPicPr>
+            <a:picLocks noChangeAspect="1"/>
+          </p:cNvPicPr>
+          <p:nvPr/>
+        </p:nvPicPr>
+        <p:blipFill>
+          <a:blip r:embed="rId2"/>
+          <a:stretch>
+            <a:fillRect/>
+          </a:stretch>
+        </p:blipFill>
+        <p:spPr>
+          <a:xfrm>
+            <a:off x="2187448" y="1340703"/>
+            <a:ext cx="9825609" cy="4877562"/>
+          </a:xfrm>
+          <a:prstGeom prst="rect">
+            <a:avLst/>
+          </a:prstGeom>
+          <a:effectLst>
+            <a:glow rad="101600">
+              <a:schemeClr val="accent5">
+                <a:satMod val="175000"/>
+                <a:alpha val="40000"/>
+              </a:schemeClr>
+            </a:glow>
+          </a:effectLst>
+        </p:spPr>
+      </p:pic>
     </p:spTree>
     <p:extLst>
       <p:ext uri="{BB962C8B-B14F-4D97-AF65-F5344CB8AC3E}">
-        <p14:creationId xmlns:p14="http://schemas.microsoft.com/office/powerpoint/2010/main" val="1086617000"/>
+        <p14:creationId xmlns:p14="http://schemas.microsoft.com/office/powerpoint/2010/main" val="1347280084"/>
       </p:ext>
     </p:extLst>
   </p:cSld>
@@ -7921,8 +9407,8 @@
         </p:nvSpPr>
         <p:spPr>
           <a:xfrm>
-            <a:off x="299655" y="74303"/>
-            <a:ext cx="2702856" cy="461665"/>
+            <a:off x="378314" y="2719180"/>
+            <a:ext cx="2204065" cy="461665"/>
           </a:xfrm>
           <a:prstGeom prst="rect">
             <a:avLst/>
@@ -7937,7 +9423,7 @@
           <a:p>
             <a:r>
               <a:rPr lang="en-US" sz="2400" dirty="0"/>
-              <a:t>Agent Orchestration</a:t>
+              <a:t>Agent Workflow</a:t>
             </a:r>
           </a:p>
         </p:txBody>
@@ -7947,7 +9433,7 @@
           <p:cNvPr id="2" name="Straight Connector 1">
             <a:extLst>
               <a:ext uri="{FF2B5EF4-FFF2-40B4-BE49-F238E27FC236}">
-                <a16:creationId xmlns:a16="http://schemas.microsoft.com/office/drawing/2014/main" id="{22E1BF60-C091-F918-A508-C0CD2544E876}"/>
+                <a16:creationId xmlns:a16="http://schemas.microsoft.com/office/drawing/2014/main" id="{89154393-A6FF-CF4B-8A1D-57D7E90FAC33}"/>
               </a:ext>
             </a:extLst>
           </p:cNvPr>
@@ -7956,7 +9442,7 @@
         </p:nvCxnSpPr>
         <p:spPr>
           <a:xfrm>
-            <a:off x="432619" y="545800"/>
+            <a:off x="432619" y="3156155"/>
             <a:ext cx="11759381" cy="0"/>
           </a:xfrm>
           <a:prstGeom prst="line">
@@ -7978,86 +9464,10 @@
           </a:fontRef>
         </p:style>
       </p:cxnSp>
-      <p:pic>
-        <p:nvPicPr>
-          <p:cNvPr id="3" name="Picture 2">
-            <a:extLst>
-              <a:ext uri="{FF2B5EF4-FFF2-40B4-BE49-F238E27FC236}">
-                <a16:creationId xmlns:a16="http://schemas.microsoft.com/office/drawing/2014/main" id="{06D2A7A1-41B6-3809-CE19-54125905CBE9}"/>
-              </a:ext>
-            </a:extLst>
-          </p:cNvPr>
-          <p:cNvPicPr>
-            <a:picLocks noChangeAspect="1"/>
-          </p:cNvPicPr>
-          <p:nvPr/>
-        </p:nvPicPr>
-        <p:blipFill>
-          <a:blip r:embed="rId2"/>
-          <a:stretch>
-            <a:fillRect/>
-          </a:stretch>
-        </p:blipFill>
-        <p:spPr>
-          <a:xfrm>
-            <a:off x="1895168" y="683452"/>
-            <a:ext cx="8331200" cy="1544320"/>
-          </a:xfrm>
-          <a:prstGeom prst="rect">
-            <a:avLst/>
-          </a:prstGeom>
-          <a:effectLst>
-            <a:glow rad="63500">
-              <a:schemeClr val="accent5">
-                <a:satMod val="175000"/>
-                <a:alpha val="40000"/>
-              </a:schemeClr>
-            </a:glow>
-          </a:effectLst>
-        </p:spPr>
-      </p:pic>
-      <p:pic>
-        <p:nvPicPr>
-          <p:cNvPr id="5" name="Picture 4">
-            <a:extLst>
-              <a:ext uri="{FF2B5EF4-FFF2-40B4-BE49-F238E27FC236}">
-                <a16:creationId xmlns:a16="http://schemas.microsoft.com/office/drawing/2014/main" id="{032B032F-B08F-D8D1-3E1F-E0A14A3D7972}"/>
-              </a:ext>
-            </a:extLst>
-          </p:cNvPr>
-          <p:cNvPicPr>
-            <a:picLocks noChangeAspect="1"/>
-          </p:cNvPicPr>
-          <p:nvPr/>
-        </p:nvPicPr>
-        <p:blipFill>
-          <a:blip r:embed="rId3"/>
-          <a:stretch>
-            <a:fillRect/>
-          </a:stretch>
-        </p:blipFill>
-        <p:spPr>
-          <a:xfrm>
-            <a:off x="1910187" y="2365423"/>
-            <a:ext cx="8320278" cy="4245356"/>
-          </a:xfrm>
-          <a:prstGeom prst="rect">
-            <a:avLst/>
-          </a:prstGeom>
-          <a:effectLst>
-            <a:glow rad="101600">
-              <a:schemeClr val="accent5">
-                <a:satMod val="175000"/>
-                <a:alpha val="40000"/>
-              </a:schemeClr>
-            </a:glow>
-          </a:effectLst>
-        </p:spPr>
-      </p:pic>
     </p:spTree>
     <p:extLst>
       <p:ext uri="{BB962C8B-B14F-4D97-AF65-F5344CB8AC3E}">
-        <p14:creationId xmlns:p14="http://schemas.microsoft.com/office/powerpoint/2010/main" val="2777634583"/>
+        <p14:creationId xmlns:p14="http://schemas.microsoft.com/office/powerpoint/2010/main" val="1086617000"/>
       </p:ext>
     </p:extLst>
   </p:cSld>

</xml_diff>